<commit_message>
PPP bearbeitet und neue PDF dazu erstellt
Former-commit-id: 9338d62cc607a386c38598a083a38595c88932b2
</commit_message>
<xml_diff>
--- a/documents/Meilensteine/Meilenstein I/Meilenstein_1_Präsentation.pptx
+++ b/documents/Meilensteine/Meilenstein I/Meilenstein_1_Präsentation.pptx
@@ -32,8 +32,8 @@
     <p:sldId id="276" r:id="rId26"/>
     <p:sldId id="279" r:id="rId27"/>
     <p:sldId id="290" r:id="rId28"/>
-    <p:sldId id="265" r:id="rId29"/>
-    <p:sldId id="273" r:id="rId30"/>
+    <p:sldId id="273" r:id="rId29"/>
+    <p:sldId id="265" r:id="rId30"/>
   </p:sldIdLst>
   <p:sldSz cx="12192000" cy="6858000"/>
   <p:notesSz cx="6858000" cy="9144000"/>
@@ -190,7 +190,7 @@
           <a:noFill/>
           <a:extLst>
             <a:ext uri="{909E8E84-426E-40dd-AFC4-6F175D3DCCD1}">
-              <a14:hiddenFill xmlns="" xmlns:a14="http://schemas.microsoft.com/office/drawing/2010/main">
+              <a14:hiddenFill xmlns:a14="http://schemas.microsoft.com/office/drawing/2010/main" xmlns="">
                 <a:solidFill>
                   <a:srgbClr val="FFFFFF"/>
                 </a:solidFill>
@@ -250,7 +250,7 @@
             </a:ln>
             <a:extLst>
               <a:ext uri="{91240B29-F687-4f45-9708-019B960494DF}">
-                <a14:hiddenLine xmlns="" xmlns:a14="http://schemas.microsoft.com/office/drawing/2010/main" w="9525">
+                <a14:hiddenLine xmlns:a14="http://schemas.microsoft.com/office/drawing/2010/main" xmlns="" w="9525">
                   <a:solidFill>
                     <a:srgbClr val="000000"/>
                   </a:solidFill>
@@ -340,7 +340,7 @@
             </a:ln>
             <a:extLst>
               <a:ext uri="{91240B29-F687-4f45-9708-019B960494DF}">
-                <a14:hiddenLine xmlns="" xmlns:a14="http://schemas.microsoft.com/office/drawing/2010/main" w="9525">
+                <a14:hiddenLine xmlns:a14="http://schemas.microsoft.com/office/drawing/2010/main" xmlns="" w="9525">
                   <a:solidFill>
                     <a:srgbClr val="000000"/>
                   </a:solidFill>
@@ -430,7 +430,7 @@
             </a:ln>
             <a:extLst>
               <a:ext uri="{91240B29-F687-4f45-9708-019B960494DF}">
-                <a14:hiddenLine xmlns="" xmlns:a14="http://schemas.microsoft.com/office/drawing/2010/main" w="9525">
+                <a14:hiddenLine xmlns:a14="http://schemas.microsoft.com/office/drawing/2010/main" xmlns="" w="9525">
                   <a:solidFill>
                     <a:srgbClr val="000000"/>
                   </a:solidFill>
@@ -464,7 +464,7 @@
             </a:ln>
             <a:extLst>
               <a:ext uri="{91240B29-F687-4f45-9708-019B960494DF}">
-                <a14:hiddenLine xmlns="" xmlns:a14="http://schemas.microsoft.com/office/drawing/2010/main" w="9525">
+                <a14:hiddenLine xmlns:a14="http://schemas.microsoft.com/office/drawing/2010/main" xmlns="" w="9525">
                   <a:solidFill>
                     <a:srgbClr val="000000"/>
                   </a:solidFill>
@@ -554,7 +554,7 @@
             </a:ln>
             <a:extLst>
               <a:ext uri="{91240B29-F687-4f45-9708-019B960494DF}">
-                <a14:hiddenLine xmlns="" xmlns:a14="http://schemas.microsoft.com/office/drawing/2010/main" w="9525">
+                <a14:hiddenLine xmlns:a14="http://schemas.microsoft.com/office/drawing/2010/main" xmlns="" w="9525">
                   <a:solidFill>
                     <a:srgbClr val="000000"/>
                   </a:solidFill>
@@ -616,7 +616,7 @@
             </a:ln>
             <a:extLst>
               <a:ext uri="{91240B29-F687-4f45-9708-019B960494DF}">
-                <a14:hiddenLine xmlns="" xmlns:a14="http://schemas.microsoft.com/office/drawing/2010/main" w="9525">
+                <a14:hiddenLine xmlns:a14="http://schemas.microsoft.com/office/drawing/2010/main" xmlns="" w="9525">
                   <a:solidFill>
                     <a:srgbClr val="000000"/>
                   </a:solidFill>
@@ -678,7 +678,7 @@
             </a:ln>
             <a:extLst>
               <a:ext uri="{91240B29-F687-4f45-9708-019B960494DF}">
-                <a14:hiddenLine xmlns="" xmlns:a14="http://schemas.microsoft.com/office/drawing/2010/main" w="9525">
+                <a14:hiddenLine xmlns:a14="http://schemas.microsoft.com/office/drawing/2010/main" xmlns="" w="9525">
                   <a:solidFill>
                     <a:srgbClr val="000000"/>
                   </a:solidFill>
@@ -768,7 +768,7 @@
             </a:ln>
             <a:extLst>
               <a:ext uri="{91240B29-F687-4f45-9708-019B960494DF}">
-                <a14:hiddenLine xmlns="" xmlns:a14="http://schemas.microsoft.com/office/drawing/2010/main" w="9525">
+                <a14:hiddenLine xmlns:a14="http://schemas.microsoft.com/office/drawing/2010/main" xmlns="" w="9525">
                   <a:solidFill>
                     <a:srgbClr val="000000"/>
                   </a:solidFill>
@@ -830,7 +830,7 @@
             </a:ln>
             <a:extLst>
               <a:ext uri="{91240B29-F687-4f45-9708-019B960494DF}">
-                <a14:hiddenLine xmlns="" xmlns:a14="http://schemas.microsoft.com/office/drawing/2010/main" w="9525">
+                <a14:hiddenLine xmlns:a14="http://schemas.microsoft.com/office/drawing/2010/main" xmlns="" w="9525">
                   <a:solidFill>
                     <a:srgbClr val="000000"/>
                   </a:solidFill>
@@ -892,7 +892,7 @@
             </a:ln>
             <a:extLst>
               <a:ext uri="{91240B29-F687-4f45-9708-019B960494DF}">
-                <a14:hiddenLine xmlns="" xmlns:a14="http://schemas.microsoft.com/office/drawing/2010/main" w="9525">
+                <a14:hiddenLine xmlns:a14="http://schemas.microsoft.com/office/drawing/2010/main" xmlns="" w="9525">
                   <a:solidFill>
                     <a:srgbClr val="000000"/>
                   </a:solidFill>
@@ -982,7 +982,7 @@
             </a:ln>
             <a:extLst>
               <a:ext uri="{91240B29-F687-4f45-9708-019B960494DF}">
-                <a14:hiddenLine xmlns="" xmlns:a14="http://schemas.microsoft.com/office/drawing/2010/main" w="9525">
+                <a14:hiddenLine xmlns:a14="http://schemas.microsoft.com/office/drawing/2010/main" xmlns="" w="9525">
                   <a:solidFill>
                     <a:srgbClr val="000000"/>
                   </a:solidFill>
@@ -1072,7 +1072,7 @@
             </a:ln>
             <a:extLst>
               <a:ext uri="{91240B29-F687-4f45-9708-019B960494DF}">
-                <a14:hiddenLine xmlns="" xmlns:a14="http://schemas.microsoft.com/office/drawing/2010/main" w="9525">
+                <a14:hiddenLine xmlns:a14="http://schemas.microsoft.com/office/drawing/2010/main" xmlns="" w="9525">
                   <a:solidFill>
                     <a:srgbClr val="000000"/>
                   </a:solidFill>
@@ -1134,7 +1134,7 @@
             </a:ln>
             <a:extLst>
               <a:ext uri="{91240B29-F687-4f45-9708-019B960494DF}">
-                <a14:hiddenLine xmlns="" xmlns:a14="http://schemas.microsoft.com/office/drawing/2010/main" w="9525">
+                <a14:hiddenLine xmlns:a14="http://schemas.microsoft.com/office/drawing/2010/main" xmlns="" w="9525">
                   <a:solidFill>
                     <a:srgbClr val="000000"/>
                   </a:solidFill>
@@ -1244,7 +1244,7 @@
             </a:ln>
             <a:extLst>
               <a:ext uri="{91240B29-F687-4f45-9708-019B960494DF}">
-                <a14:hiddenLine xmlns="" xmlns:a14="http://schemas.microsoft.com/office/drawing/2010/main" w="9525">
+                <a14:hiddenLine xmlns:a14="http://schemas.microsoft.com/office/drawing/2010/main" xmlns="" w="9525">
                   <a:solidFill>
                     <a:srgbClr val="000000"/>
                   </a:solidFill>
@@ -1306,7 +1306,7 @@
             </a:ln>
             <a:extLst>
               <a:ext uri="{91240B29-F687-4f45-9708-019B960494DF}">
-                <a14:hiddenLine xmlns="" xmlns:a14="http://schemas.microsoft.com/office/drawing/2010/main" w="9525">
+                <a14:hiddenLine xmlns:a14="http://schemas.microsoft.com/office/drawing/2010/main" xmlns="" w="9525">
                   <a:solidFill>
                     <a:srgbClr val="000000"/>
                   </a:solidFill>
@@ -1396,7 +1396,7 @@
             </a:ln>
             <a:extLst>
               <a:ext uri="{91240B29-F687-4f45-9708-019B960494DF}">
-                <a14:hiddenLine xmlns="" xmlns:a14="http://schemas.microsoft.com/office/drawing/2010/main" w="9525">
+                <a14:hiddenLine xmlns:a14="http://schemas.microsoft.com/office/drawing/2010/main" xmlns="" w="9525">
                   <a:solidFill>
                     <a:srgbClr val="000000"/>
                   </a:solidFill>
@@ -1486,7 +1486,7 @@
             </a:ln>
             <a:extLst>
               <a:ext uri="{91240B29-F687-4f45-9708-019B960494DF}">
-                <a14:hiddenLine xmlns="" xmlns:a14="http://schemas.microsoft.com/office/drawing/2010/main" w="9525">
+                <a14:hiddenLine xmlns:a14="http://schemas.microsoft.com/office/drawing/2010/main" xmlns="" w="9525">
                   <a:solidFill>
                     <a:srgbClr val="000000"/>
                   </a:solidFill>
@@ -1548,7 +1548,7 @@
             </a:ln>
             <a:extLst>
               <a:ext uri="{91240B29-F687-4f45-9708-019B960494DF}">
-                <a14:hiddenLine xmlns="" xmlns:a14="http://schemas.microsoft.com/office/drawing/2010/main" w="9525">
+                <a14:hiddenLine xmlns:a14="http://schemas.microsoft.com/office/drawing/2010/main" xmlns="" w="9525">
                   <a:solidFill>
                     <a:srgbClr val="000000"/>
                   </a:solidFill>
@@ -1638,7 +1638,7 @@
             </a:ln>
             <a:extLst>
               <a:ext uri="{91240B29-F687-4f45-9708-019B960494DF}">
-                <a14:hiddenLine xmlns="" xmlns:a14="http://schemas.microsoft.com/office/drawing/2010/main" w="9525">
+                <a14:hiddenLine xmlns:a14="http://schemas.microsoft.com/office/drawing/2010/main" xmlns="" w="9525">
                   <a:solidFill>
                     <a:srgbClr val="000000"/>
                   </a:solidFill>
@@ -1728,7 +1728,7 @@
             </a:ln>
             <a:extLst>
               <a:ext uri="{91240B29-F687-4f45-9708-019B960494DF}">
-                <a14:hiddenLine xmlns="" xmlns:a14="http://schemas.microsoft.com/office/drawing/2010/main" w="9525">
+                <a14:hiddenLine xmlns:a14="http://schemas.microsoft.com/office/drawing/2010/main" xmlns="" w="9525">
                   <a:solidFill>
                     <a:srgbClr val="000000"/>
                   </a:solidFill>
@@ -1784,7 +1784,7 @@
             </a:ln>
             <a:extLst>
               <a:ext uri="{91240B29-F687-4f45-9708-019B960494DF}">
-                <a14:hiddenLine xmlns="" xmlns:a14="http://schemas.microsoft.com/office/drawing/2010/main" w="9525">
+                <a14:hiddenLine xmlns:a14="http://schemas.microsoft.com/office/drawing/2010/main" xmlns="" w="9525">
                   <a:solidFill>
                     <a:srgbClr val="000000"/>
                   </a:solidFill>
@@ -1874,7 +1874,7 @@
             </a:ln>
             <a:extLst>
               <a:ext uri="{91240B29-F687-4f45-9708-019B960494DF}">
-                <a14:hiddenLine xmlns="" xmlns:a14="http://schemas.microsoft.com/office/drawing/2010/main" w="9525">
+                <a14:hiddenLine xmlns:a14="http://schemas.microsoft.com/office/drawing/2010/main" xmlns="" w="9525">
                   <a:solidFill>
                     <a:srgbClr val="000000"/>
                   </a:solidFill>
@@ -1930,7 +1930,7 @@
             </a:ln>
             <a:extLst>
               <a:ext uri="{91240B29-F687-4f45-9708-019B960494DF}">
-                <a14:hiddenLine xmlns="" xmlns:a14="http://schemas.microsoft.com/office/drawing/2010/main" w="9525">
+                <a14:hiddenLine xmlns:a14="http://schemas.microsoft.com/office/drawing/2010/main" xmlns="" w="9525">
                   <a:solidFill>
                     <a:srgbClr val="000000"/>
                   </a:solidFill>
@@ -2020,7 +2020,7 @@
             </a:ln>
             <a:extLst>
               <a:ext uri="{91240B29-F687-4f45-9708-019B960494DF}">
-                <a14:hiddenLine xmlns="" xmlns:a14="http://schemas.microsoft.com/office/drawing/2010/main" w="9525">
+                <a14:hiddenLine xmlns:a14="http://schemas.microsoft.com/office/drawing/2010/main" xmlns="" w="9525">
                   <a:solidFill>
                     <a:srgbClr val="000000"/>
                   </a:solidFill>
@@ -2088,7 +2088,7 @@
             </a:ln>
             <a:extLst>
               <a:ext uri="{91240B29-F687-4f45-9708-019B960494DF}">
-                <a14:hiddenLine xmlns="" xmlns:a14="http://schemas.microsoft.com/office/drawing/2010/main" w="9525">
+                <a14:hiddenLine xmlns:a14="http://schemas.microsoft.com/office/drawing/2010/main" xmlns="" w="9525">
                   <a:solidFill>
                     <a:srgbClr val="000000"/>
                   </a:solidFill>
@@ -2178,7 +2178,7 @@
             </a:ln>
             <a:extLst>
               <a:ext uri="{91240B29-F687-4f45-9708-019B960494DF}">
-                <a14:hiddenLine xmlns="" xmlns:a14="http://schemas.microsoft.com/office/drawing/2010/main" w="9525">
+                <a14:hiddenLine xmlns:a14="http://schemas.microsoft.com/office/drawing/2010/main" xmlns="" w="9525">
                   <a:solidFill>
                     <a:srgbClr val="000000"/>
                   </a:solidFill>
@@ -2246,7 +2246,7 @@
             </a:ln>
             <a:extLst>
               <a:ext uri="{91240B29-F687-4f45-9708-019B960494DF}">
-                <a14:hiddenLine xmlns="" xmlns:a14="http://schemas.microsoft.com/office/drawing/2010/main" w="9525">
+                <a14:hiddenLine xmlns:a14="http://schemas.microsoft.com/office/drawing/2010/main" xmlns="" w="9525">
                   <a:solidFill>
                     <a:srgbClr val="000000"/>
                   </a:solidFill>
@@ -2336,7 +2336,7 @@
             </a:ln>
             <a:extLst>
               <a:ext uri="{91240B29-F687-4f45-9708-019B960494DF}">
-                <a14:hiddenLine xmlns="" xmlns:a14="http://schemas.microsoft.com/office/drawing/2010/main" w="9525">
+                <a14:hiddenLine xmlns:a14="http://schemas.microsoft.com/office/drawing/2010/main" xmlns="" w="9525">
                   <a:solidFill>
                     <a:srgbClr val="000000"/>
                   </a:solidFill>
@@ -2370,7 +2370,7 @@
             </a:ln>
             <a:extLst>
               <a:ext uri="{91240B29-F687-4f45-9708-019B960494DF}">
-                <a14:hiddenLine xmlns="" xmlns:a14="http://schemas.microsoft.com/office/drawing/2010/main" w="9525">
+                <a14:hiddenLine xmlns:a14="http://schemas.microsoft.com/office/drawing/2010/main" xmlns="" w="9525">
                   <a:solidFill>
                     <a:srgbClr val="000000"/>
                   </a:solidFill>
@@ -2460,7 +2460,7 @@
             </a:ln>
             <a:extLst>
               <a:ext uri="{91240B29-F687-4f45-9708-019B960494DF}">
-                <a14:hiddenLine xmlns="" xmlns:a14="http://schemas.microsoft.com/office/drawing/2010/main" w="9525">
+                <a14:hiddenLine xmlns:a14="http://schemas.microsoft.com/office/drawing/2010/main" xmlns="" w="9525">
                   <a:solidFill>
                     <a:srgbClr val="000000"/>
                   </a:solidFill>
@@ -2522,7 +2522,7 @@
             </a:ln>
             <a:extLst>
               <a:ext uri="{91240B29-F687-4f45-9708-019B960494DF}">
-                <a14:hiddenLine xmlns="" xmlns:a14="http://schemas.microsoft.com/office/drawing/2010/main" w="9525">
+                <a14:hiddenLine xmlns:a14="http://schemas.microsoft.com/office/drawing/2010/main" xmlns="" w="9525">
                   <a:solidFill>
                     <a:srgbClr val="000000"/>
                   </a:solidFill>
@@ -2584,7 +2584,7 @@
             </a:ln>
             <a:extLst>
               <a:ext uri="{91240B29-F687-4f45-9708-019B960494DF}">
-                <a14:hiddenLine xmlns="" xmlns:a14="http://schemas.microsoft.com/office/drawing/2010/main" w="9525">
+                <a14:hiddenLine xmlns:a14="http://schemas.microsoft.com/office/drawing/2010/main" xmlns="" w="9525">
                   <a:solidFill>
                     <a:srgbClr val="000000"/>
                   </a:solidFill>
@@ -2674,7 +2674,7 @@
             </a:ln>
             <a:extLst>
               <a:ext uri="{91240B29-F687-4f45-9708-019B960494DF}">
-                <a14:hiddenLine xmlns="" xmlns:a14="http://schemas.microsoft.com/office/drawing/2010/main" w="9525">
+                <a14:hiddenLine xmlns:a14="http://schemas.microsoft.com/office/drawing/2010/main" xmlns="" w="9525">
                   <a:solidFill>
                     <a:srgbClr val="000000"/>
                   </a:solidFill>
@@ -2742,7 +2742,7 @@
             </a:ln>
             <a:extLst>
               <a:ext uri="{91240B29-F687-4f45-9708-019B960494DF}">
-                <a14:hiddenLine xmlns="" xmlns:a14="http://schemas.microsoft.com/office/drawing/2010/main" w="9525">
+                <a14:hiddenLine xmlns:a14="http://schemas.microsoft.com/office/drawing/2010/main" xmlns="" w="9525">
                   <a:solidFill>
                     <a:srgbClr val="000000"/>
                   </a:solidFill>
@@ -2804,7 +2804,7 @@
             </a:ln>
             <a:extLst>
               <a:ext uri="{91240B29-F687-4f45-9708-019B960494DF}">
-                <a14:hiddenLine xmlns="" xmlns:a14="http://schemas.microsoft.com/office/drawing/2010/main" w="9525">
+                <a14:hiddenLine xmlns:a14="http://schemas.microsoft.com/office/drawing/2010/main" xmlns="" w="9525">
                   <a:solidFill>
                     <a:srgbClr val="000000"/>
                   </a:solidFill>
@@ -2894,7 +2894,7 @@
             </a:ln>
             <a:extLst>
               <a:ext uri="{91240B29-F687-4f45-9708-019B960494DF}">
-                <a14:hiddenLine xmlns="" xmlns:a14="http://schemas.microsoft.com/office/drawing/2010/main" w="9525">
+                <a14:hiddenLine xmlns:a14="http://schemas.microsoft.com/office/drawing/2010/main" xmlns="" w="9525">
                   <a:solidFill>
                     <a:srgbClr val="000000"/>
                   </a:solidFill>
@@ -2956,7 +2956,7 @@
             </a:ln>
             <a:extLst>
               <a:ext uri="{91240B29-F687-4f45-9708-019B960494DF}">
-                <a14:hiddenLine xmlns="" xmlns:a14="http://schemas.microsoft.com/office/drawing/2010/main" w="9525">
+                <a14:hiddenLine xmlns:a14="http://schemas.microsoft.com/office/drawing/2010/main" xmlns="" w="9525">
                   <a:solidFill>
                     <a:srgbClr val="000000"/>
                   </a:solidFill>
@@ -3046,7 +3046,7 @@
             </a:ln>
             <a:extLst>
               <a:ext uri="{91240B29-F687-4f45-9708-019B960494DF}">
-                <a14:hiddenLine xmlns="" xmlns:a14="http://schemas.microsoft.com/office/drawing/2010/main" w="9525">
+                <a14:hiddenLine xmlns:a14="http://schemas.microsoft.com/office/drawing/2010/main" xmlns="" w="9525">
                   <a:solidFill>
                     <a:srgbClr val="000000"/>
                   </a:solidFill>
@@ -3108,7 +3108,7 @@
             </a:ln>
             <a:extLst>
               <a:ext uri="{91240B29-F687-4f45-9708-019B960494DF}">
-                <a14:hiddenLine xmlns="" xmlns:a14="http://schemas.microsoft.com/office/drawing/2010/main" w="9525">
+                <a14:hiddenLine xmlns:a14="http://schemas.microsoft.com/office/drawing/2010/main" xmlns="" w="9525">
                   <a:solidFill>
                     <a:srgbClr val="000000"/>
                   </a:solidFill>
@@ -3198,7 +3198,7 @@
             </a:ln>
             <a:extLst>
               <a:ext uri="{91240B29-F687-4f45-9708-019B960494DF}">
-                <a14:hiddenLine xmlns="" xmlns:a14="http://schemas.microsoft.com/office/drawing/2010/main" w="9525">
+                <a14:hiddenLine xmlns:a14="http://schemas.microsoft.com/office/drawing/2010/main" xmlns="" w="9525">
                   <a:solidFill>
                     <a:srgbClr val="000000"/>
                   </a:solidFill>
@@ -3232,7 +3232,7 @@
             </a:ln>
             <a:extLst>
               <a:ext uri="{91240B29-F687-4f45-9708-019B960494DF}">
-                <a14:hiddenLine xmlns="" xmlns:a14="http://schemas.microsoft.com/office/drawing/2010/main" w="9525">
+                <a14:hiddenLine xmlns:a14="http://schemas.microsoft.com/office/drawing/2010/main" xmlns="" w="9525">
                   <a:solidFill>
                     <a:srgbClr val="000000"/>
                   </a:solidFill>
@@ -3297,7 +3297,7 @@
             </a:ln>
             <a:extLst>
               <a:ext uri="{91240B29-F687-4f45-9708-019B960494DF}">
-                <a14:hiddenLine xmlns="" xmlns:a14="http://schemas.microsoft.com/office/drawing/2010/main" w="9525">
+                <a14:hiddenLine xmlns:a14="http://schemas.microsoft.com/office/drawing/2010/main" xmlns="" w="9525">
                   <a:solidFill>
                     <a:srgbClr val="000000"/>
                   </a:solidFill>
@@ -3387,7 +3387,7 @@
             </a:ln>
             <a:extLst>
               <a:ext uri="{91240B29-F687-4f45-9708-019B960494DF}">
-                <a14:hiddenLine xmlns="" xmlns:a14="http://schemas.microsoft.com/office/drawing/2010/main" w="9525">
+                <a14:hiddenLine xmlns:a14="http://schemas.microsoft.com/office/drawing/2010/main" xmlns="" w="9525">
                   <a:solidFill>
                     <a:srgbClr val="000000"/>
                   </a:solidFill>
@@ -3449,7 +3449,7 @@
             </a:ln>
             <a:extLst>
               <a:ext uri="{91240B29-F687-4f45-9708-019B960494DF}">
-                <a14:hiddenLine xmlns="" xmlns:a14="http://schemas.microsoft.com/office/drawing/2010/main" w="9525">
+                <a14:hiddenLine xmlns:a14="http://schemas.microsoft.com/office/drawing/2010/main" xmlns="" w="9525">
                   <a:solidFill>
                     <a:srgbClr val="000000"/>
                   </a:solidFill>
@@ -3539,7 +3539,7 @@
             </a:ln>
             <a:extLst>
               <a:ext uri="{91240B29-F687-4f45-9708-019B960494DF}">
-                <a14:hiddenLine xmlns="" xmlns:a14="http://schemas.microsoft.com/office/drawing/2010/main" w="9525">
+                <a14:hiddenLine xmlns:a14="http://schemas.microsoft.com/office/drawing/2010/main" xmlns="" w="9525">
                   <a:solidFill>
                     <a:srgbClr val="000000"/>
                   </a:solidFill>
@@ -3629,7 +3629,7 @@
             </a:ln>
             <a:extLst>
               <a:ext uri="{91240B29-F687-4f45-9708-019B960494DF}">
-                <a14:hiddenLine xmlns="" xmlns:a14="http://schemas.microsoft.com/office/drawing/2010/main" w="9525">
+                <a14:hiddenLine xmlns:a14="http://schemas.microsoft.com/office/drawing/2010/main" xmlns="" w="9525">
                   <a:solidFill>
                     <a:srgbClr val="000000"/>
                   </a:solidFill>
@@ -3694,7 +3694,7 @@
             </a:ln>
             <a:extLst>
               <a:ext uri="{91240B29-F687-4f45-9708-019B960494DF}">
-                <a14:hiddenLine xmlns="" xmlns:a14="http://schemas.microsoft.com/office/drawing/2010/main" w="9525">
+                <a14:hiddenLine xmlns:a14="http://schemas.microsoft.com/office/drawing/2010/main" xmlns="" w="9525">
                   <a:solidFill>
                     <a:srgbClr val="000000"/>
                   </a:solidFill>
@@ -3756,7 +3756,7 @@
             </a:ln>
             <a:extLst>
               <a:ext uri="{91240B29-F687-4f45-9708-019B960494DF}">
-                <a14:hiddenLine xmlns="" xmlns:a14="http://schemas.microsoft.com/office/drawing/2010/main" w="9525">
+                <a14:hiddenLine xmlns:a14="http://schemas.microsoft.com/office/drawing/2010/main" xmlns="" w="9525">
                   <a:solidFill>
                     <a:srgbClr val="000000"/>
                   </a:solidFill>
@@ -3846,7 +3846,7 @@
             </a:ln>
             <a:extLst>
               <a:ext uri="{91240B29-F687-4f45-9708-019B960494DF}">
-                <a14:hiddenLine xmlns="" xmlns:a14="http://schemas.microsoft.com/office/drawing/2010/main" w="9525">
+                <a14:hiddenLine xmlns:a14="http://schemas.microsoft.com/office/drawing/2010/main" xmlns="" w="9525">
                   <a:solidFill>
                     <a:srgbClr val="000000"/>
                   </a:solidFill>
@@ -3936,7 +3936,7 @@
             </a:ln>
             <a:extLst>
               <a:ext uri="{91240B29-F687-4f45-9708-019B960494DF}">
-                <a14:hiddenLine xmlns="" xmlns:a14="http://schemas.microsoft.com/office/drawing/2010/main" w="9525">
+                <a14:hiddenLine xmlns:a14="http://schemas.microsoft.com/office/drawing/2010/main" xmlns="" w="9525">
                   <a:solidFill>
                     <a:srgbClr val="000000"/>
                   </a:solidFill>
@@ -3998,7 +3998,7 @@
             </a:ln>
             <a:extLst>
               <a:ext uri="{91240B29-F687-4f45-9708-019B960494DF}">
-                <a14:hiddenLine xmlns="" xmlns:a14="http://schemas.microsoft.com/office/drawing/2010/main" w="9525">
+                <a14:hiddenLine xmlns:a14="http://schemas.microsoft.com/office/drawing/2010/main" xmlns="" w="9525">
                   <a:solidFill>
                     <a:srgbClr val="000000"/>
                   </a:solidFill>
@@ -4118,7 +4118,7 @@
             </a:ln>
             <a:extLst>
               <a:ext uri="{91240B29-F687-4f45-9708-019B960494DF}">
-                <a14:hiddenLine xmlns="" xmlns:a14="http://schemas.microsoft.com/office/drawing/2010/main" w="9525">
+                <a14:hiddenLine xmlns:a14="http://schemas.microsoft.com/office/drawing/2010/main" xmlns="" w="9525">
                   <a:solidFill>
                     <a:srgbClr val="000000"/>
                   </a:solidFill>
@@ -4186,7 +4186,7 @@
             </a:ln>
             <a:extLst>
               <a:ext uri="{91240B29-F687-4f45-9708-019B960494DF}">
-                <a14:hiddenLine xmlns="" xmlns:a14="http://schemas.microsoft.com/office/drawing/2010/main" w="9525">
+                <a14:hiddenLine xmlns:a14="http://schemas.microsoft.com/office/drawing/2010/main" xmlns="" w="9525">
                   <a:solidFill>
                     <a:srgbClr val="000000"/>
                   </a:solidFill>
@@ -4276,7 +4276,7 @@
             </a:ln>
             <a:extLst>
               <a:ext uri="{91240B29-F687-4f45-9708-019B960494DF}">
-                <a14:hiddenLine xmlns="" xmlns:a14="http://schemas.microsoft.com/office/drawing/2010/main" w="9525">
+                <a14:hiddenLine xmlns:a14="http://schemas.microsoft.com/office/drawing/2010/main" xmlns="" w="9525">
                   <a:solidFill>
                     <a:srgbClr val="000000"/>
                   </a:solidFill>
@@ -4416,7 +4416,7 @@
           <a:p>
             <a:fld id="{9AB3A824-1A51-4B26-AD58-A6D8E14F6C04}" type="datetimeFigureOut">
               <a:rPr lang="en-US" smtClean="0"/>
-              <a:t>3/6/20</a:t>
+              <a:t>3/9/20</a:t>
             </a:fld>
             <a:endParaRPr lang="en-US" dirty="0"/>
           </a:p>
@@ -4688,7 +4688,7 @@
           <a:p>
             <a:fld id="{3CBC1C18-307B-4F68-A007-B5B542270E8D}" type="datetimeFigureOut">
               <a:rPr lang="en-US" smtClean="0"/>
-              <a:t>3/6/20</a:t>
+              <a:t>3/9/20</a:t>
             </a:fld>
             <a:endParaRPr lang="en-US" dirty="0"/>
           </a:p>
@@ -4891,7 +4891,7 @@
           <a:p>
             <a:fld id="{3CBC1C18-307B-4F68-A007-B5B542270E8D}" type="datetimeFigureOut">
               <a:rPr lang="en-US" smtClean="0"/>
-              <a:t>3/6/20</a:t>
+              <a:t>3/9/20</a:t>
             </a:fld>
             <a:endParaRPr lang="en-US" dirty="0"/>
           </a:p>
@@ -5161,7 +5161,7 @@
           <a:p>
             <a:fld id="{3CBC1C18-307B-4F68-A007-B5B542270E8D}" type="datetimeFigureOut">
               <a:rPr lang="en-US" smtClean="0"/>
-              <a:t>3/6/20</a:t>
+              <a:t>3/9/20</a:t>
             </a:fld>
             <a:endParaRPr lang="en-US" dirty="0"/>
           </a:p>
@@ -5602,7 +5602,7 @@
           <a:p>
             <a:fld id="{3CBC1C18-307B-4F68-A007-B5B542270E8D}" type="datetimeFigureOut">
               <a:rPr lang="en-US" smtClean="0"/>
-              <a:t>3/6/20</a:t>
+              <a:t>3/9/20</a:t>
             </a:fld>
             <a:endParaRPr lang="en-US" dirty="0"/>
           </a:p>
@@ -6155,7 +6155,7 @@
           <a:p>
             <a:fld id="{3CBC1C18-307B-4F68-A007-B5B542270E8D}" type="datetimeFigureOut">
               <a:rPr lang="en-US" smtClean="0"/>
-              <a:t>3/6/20</a:t>
+              <a:t>3/9/20</a:t>
             </a:fld>
             <a:endParaRPr lang="en-US" dirty="0"/>
           </a:p>
@@ -6882,7 +6882,7 @@
           <a:p>
             <a:fld id="{3CBC1C18-307B-4F68-A007-B5B542270E8D}" type="datetimeFigureOut">
               <a:rPr lang="en-US" smtClean="0"/>
-              <a:t>3/6/20</a:t>
+              <a:t>3/9/20</a:t>
             </a:fld>
             <a:endParaRPr lang="en-US" dirty="0"/>
           </a:p>
@@ -7059,7 +7059,7 @@
           <a:p>
             <a:fld id="{D857E33E-8B18-4087-B112-809917729534}" type="datetimeFigureOut">
               <a:rPr lang="en-US" smtClean="0"/>
-              <a:t>3/6/20</a:t>
+              <a:t>3/9/20</a:t>
             </a:fld>
             <a:endParaRPr lang="en-US" dirty="0"/>
           </a:p>
@@ -7244,7 +7244,7 @@
           <a:p>
             <a:fld id="{D3FFE419-2371-464F-8239-3959401C3561}" type="datetimeFigureOut">
               <a:rPr lang="en-US" smtClean="0"/>
-              <a:t>3/6/20</a:t>
+              <a:t>3/9/20</a:t>
             </a:fld>
             <a:endParaRPr lang="en-US" dirty="0"/>
           </a:p>
@@ -7419,7 +7419,7 @@
           <a:p>
             <a:fld id="{97D162C4-EDD9-4389-A98B-B87ECEA2A816}" type="datetimeFigureOut">
               <a:rPr lang="en-US" smtClean="0"/>
-              <a:t>3/6/20</a:t>
+              <a:t>3/9/20</a:t>
             </a:fld>
             <a:endParaRPr lang="en-US" dirty="0"/>
           </a:p>
@@ -7674,7 +7674,7 @@
           <a:p>
             <a:fld id="{3E5059C3-6A89-4494-99FF-5A4D6FFD50EB}" type="datetimeFigureOut">
               <a:rPr lang="en-US" smtClean="0"/>
-              <a:t>3/6/20</a:t>
+              <a:t>3/9/20</a:t>
             </a:fld>
             <a:endParaRPr lang="en-US" dirty="0"/>
           </a:p>
@@ -7911,7 +7911,7 @@
           <a:p>
             <a:fld id="{CA954B2F-12DE-47F5-8894-472B206D2E1E}" type="datetimeFigureOut">
               <a:rPr lang="en-US" smtClean="0"/>
-              <a:t>3/6/20</a:t>
+              <a:t>3/9/20</a:t>
             </a:fld>
             <a:endParaRPr lang="en-US" dirty="0"/>
           </a:p>
@@ -8297,7 +8297,7 @@
           <a:p>
             <a:fld id="{3CBC1C18-307B-4F68-A007-B5B542270E8D}" type="datetimeFigureOut">
               <a:rPr lang="en-US" smtClean="0"/>
-              <a:t>3/6/20</a:t>
+              <a:t>3/9/20</a:t>
             </a:fld>
             <a:endParaRPr lang="en-US" dirty="0"/>
           </a:p>
@@ -8422,7 +8422,7 @@
           <a:p>
             <a:fld id="{1FAF3416-4057-4DAA-829D-4CA07428D088}" type="datetimeFigureOut">
               <a:rPr lang="en-US" smtClean="0"/>
-              <a:t>3/6/20</a:t>
+              <a:t>3/9/20</a:t>
             </a:fld>
             <a:endParaRPr lang="en-US" dirty="0"/>
           </a:p>
@@ -8522,7 +8522,7 @@
           <a:p>
             <a:fld id="{921D9284-D300-4297-87F7-E791DCC15DB1}" type="datetimeFigureOut">
               <a:rPr lang="en-US" smtClean="0"/>
-              <a:t>3/6/20</a:t>
+              <a:t>3/9/20</a:t>
             </a:fld>
             <a:endParaRPr lang="en-US" dirty="0"/>
           </a:p>
@@ -8776,7 +8776,7 @@
           <a:p>
             <a:fld id="{37D525BB-DA17-4BA0-B3C8-3AC3ABC827E6}" type="datetimeFigureOut">
               <a:rPr lang="en-US" smtClean="0"/>
-              <a:t>3/6/20</a:t>
+              <a:t>3/9/20</a:t>
             </a:fld>
             <a:endParaRPr lang="en-US" dirty="0"/>
           </a:p>
@@ -9061,7 +9061,7 @@
           <a:p>
             <a:fld id="{B16C4C9A-3960-41CF-A4E9-2A8FB932454B}" type="datetimeFigureOut">
               <a:rPr lang="en-US" smtClean="0"/>
-              <a:t>3/6/20</a:t>
+              <a:t>3/9/20</a:t>
             </a:fld>
             <a:endParaRPr lang="en-US" dirty="0"/>
           </a:p>
@@ -9182,7 +9182,7 @@
           <a:noFill/>
           <a:extLst>
             <a:ext uri="{909E8E84-426E-40dd-AFC4-6F175D3DCCD1}">
-              <a14:hiddenFill xmlns="" xmlns:a14="http://schemas.microsoft.com/office/drawing/2010/main">
+              <a14:hiddenFill xmlns:a14="http://schemas.microsoft.com/office/drawing/2010/main" xmlns="">
                 <a:solidFill>
                   <a:srgbClr val="FFFFFF"/>
                 </a:solidFill>
@@ -9256,7 +9256,7 @@
               </a:ln>
               <a:extLst>
                 <a:ext uri="{91240B29-F687-4f45-9708-019B960494DF}">
-                  <a14:hiddenLine xmlns="" xmlns:a14="http://schemas.microsoft.com/office/drawing/2010/main" w="9525">
+                  <a14:hiddenLine xmlns:a14="http://schemas.microsoft.com/office/drawing/2010/main" xmlns="" w="9525">
                     <a:solidFill>
                       <a:srgbClr val="000000"/>
                     </a:solidFill>
@@ -9346,7 +9346,7 @@
               </a:ln>
               <a:extLst>
                 <a:ext uri="{91240B29-F687-4f45-9708-019B960494DF}">
-                  <a14:hiddenLine xmlns="" xmlns:a14="http://schemas.microsoft.com/office/drawing/2010/main" w="9525">
+                  <a14:hiddenLine xmlns:a14="http://schemas.microsoft.com/office/drawing/2010/main" xmlns="" w="9525">
                     <a:solidFill>
                       <a:srgbClr val="000000"/>
                     </a:solidFill>
@@ -9436,7 +9436,7 @@
               </a:ln>
               <a:extLst>
                 <a:ext uri="{91240B29-F687-4f45-9708-019B960494DF}">
-                  <a14:hiddenLine xmlns="" xmlns:a14="http://schemas.microsoft.com/office/drawing/2010/main" w="9525">
+                  <a14:hiddenLine xmlns:a14="http://schemas.microsoft.com/office/drawing/2010/main" xmlns="" w="9525">
                     <a:solidFill>
                       <a:srgbClr val="000000"/>
                     </a:solidFill>
@@ -9498,7 +9498,7 @@
               </a:ln>
               <a:extLst>
                 <a:ext uri="{91240B29-F687-4f45-9708-019B960494DF}">
-                  <a14:hiddenLine xmlns="" xmlns:a14="http://schemas.microsoft.com/office/drawing/2010/main" w="9525">
+                  <a14:hiddenLine xmlns:a14="http://schemas.microsoft.com/office/drawing/2010/main" xmlns="" w="9525">
                     <a:solidFill>
                       <a:srgbClr val="000000"/>
                     </a:solidFill>
@@ -9588,7 +9588,7 @@
               </a:ln>
               <a:extLst>
                 <a:ext uri="{91240B29-F687-4f45-9708-019B960494DF}">
-                  <a14:hiddenLine xmlns="" xmlns:a14="http://schemas.microsoft.com/office/drawing/2010/main" w="9525">
+                  <a14:hiddenLine xmlns:a14="http://schemas.microsoft.com/office/drawing/2010/main" xmlns="" w="9525">
                     <a:solidFill>
                       <a:srgbClr val="000000"/>
                     </a:solidFill>
@@ -9650,7 +9650,7 @@
               </a:ln>
               <a:extLst>
                 <a:ext uri="{91240B29-F687-4f45-9708-019B960494DF}">
-                  <a14:hiddenLine xmlns="" xmlns:a14="http://schemas.microsoft.com/office/drawing/2010/main" w="9525">
+                  <a14:hiddenLine xmlns:a14="http://schemas.microsoft.com/office/drawing/2010/main" xmlns="" w="9525">
                     <a:solidFill>
                       <a:srgbClr val="000000"/>
                     </a:solidFill>
@@ -9712,7 +9712,7 @@
               </a:ln>
               <a:extLst>
                 <a:ext uri="{91240B29-F687-4f45-9708-019B960494DF}">
-                  <a14:hiddenLine xmlns="" xmlns:a14="http://schemas.microsoft.com/office/drawing/2010/main" w="9525">
+                  <a14:hiddenLine xmlns:a14="http://schemas.microsoft.com/office/drawing/2010/main" xmlns="" w="9525">
                     <a:solidFill>
                       <a:srgbClr val="000000"/>
                     </a:solidFill>
@@ -9802,7 +9802,7 @@
               </a:ln>
               <a:extLst>
                 <a:ext uri="{91240B29-F687-4f45-9708-019B960494DF}">
-                  <a14:hiddenLine xmlns="" xmlns:a14="http://schemas.microsoft.com/office/drawing/2010/main" w="9525">
+                  <a14:hiddenLine xmlns:a14="http://schemas.microsoft.com/office/drawing/2010/main" xmlns="" w="9525">
                     <a:solidFill>
                       <a:srgbClr val="000000"/>
                     </a:solidFill>
@@ -9892,7 +9892,7 @@
               </a:ln>
               <a:extLst>
                 <a:ext uri="{91240B29-F687-4f45-9708-019B960494DF}">
-                  <a14:hiddenLine xmlns="" xmlns:a14="http://schemas.microsoft.com/office/drawing/2010/main" w="9525">
+                  <a14:hiddenLine xmlns:a14="http://schemas.microsoft.com/office/drawing/2010/main" xmlns="" w="9525">
                     <a:solidFill>
                       <a:srgbClr val="000000"/>
                     </a:solidFill>
@@ -9954,7 +9954,7 @@
               </a:ln>
               <a:extLst>
                 <a:ext uri="{91240B29-F687-4f45-9708-019B960494DF}">
-                  <a14:hiddenLine xmlns="" xmlns:a14="http://schemas.microsoft.com/office/drawing/2010/main" w="9525">
+                  <a14:hiddenLine xmlns:a14="http://schemas.microsoft.com/office/drawing/2010/main" xmlns="" w="9525">
                     <a:solidFill>
                       <a:srgbClr val="000000"/>
                     </a:solidFill>
@@ -10064,7 +10064,7 @@
               </a:ln>
               <a:extLst>
                 <a:ext uri="{91240B29-F687-4f45-9708-019B960494DF}">
-                  <a14:hiddenLine xmlns="" xmlns:a14="http://schemas.microsoft.com/office/drawing/2010/main" w="9525">
+                  <a14:hiddenLine xmlns:a14="http://schemas.microsoft.com/office/drawing/2010/main" xmlns="" w="9525">
                     <a:solidFill>
                       <a:srgbClr val="000000"/>
                     </a:solidFill>
@@ -10148,7 +10148,7 @@
               </a:ln>
               <a:extLst>
                 <a:ext uri="{91240B29-F687-4f45-9708-019B960494DF}">
-                  <a14:hiddenLine xmlns="" xmlns:a14="http://schemas.microsoft.com/office/drawing/2010/main" w="9525">
+                  <a14:hiddenLine xmlns:a14="http://schemas.microsoft.com/office/drawing/2010/main" xmlns="" w="9525">
                     <a:solidFill>
                       <a:srgbClr val="000000"/>
                     </a:solidFill>
@@ -10210,7 +10210,7 @@
               </a:ln>
               <a:extLst>
                 <a:ext uri="{91240B29-F687-4f45-9708-019B960494DF}">
-                  <a14:hiddenLine xmlns="" xmlns:a14="http://schemas.microsoft.com/office/drawing/2010/main" w="9525">
+                  <a14:hiddenLine xmlns:a14="http://schemas.microsoft.com/office/drawing/2010/main" xmlns="" w="9525">
                     <a:solidFill>
                       <a:srgbClr val="000000"/>
                     </a:solidFill>
@@ -10272,7 +10272,7 @@
               </a:ln>
               <a:extLst>
                 <a:ext uri="{91240B29-F687-4f45-9708-019B960494DF}">
-                  <a14:hiddenLine xmlns="" xmlns:a14="http://schemas.microsoft.com/office/drawing/2010/main" w="9525">
+                  <a14:hiddenLine xmlns:a14="http://schemas.microsoft.com/office/drawing/2010/main" xmlns="" w="9525">
                     <a:solidFill>
                       <a:srgbClr val="000000"/>
                     </a:solidFill>
@@ -10362,7 +10362,7 @@
               </a:ln>
               <a:extLst>
                 <a:ext uri="{91240B29-F687-4f45-9708-019B960494DF}">
-                  <a14:hiddenLine xmlns="" xmlns:a14="http://schemas.microsoft.com/office/drawing/2010/main" w="9525">
+                  <a14:hiddenLine xmlns:a14="http://schemas.microsoft.com/office/drawing/2010/main" xmlns="" w="9525">
                     <a:solidFill>
                       <a:srgbClr val="000000"/>
                     </a:solidFill>
@@ -10396,7 +10396,7 @@
               </a:ln>
               <a:extLst>
                 <a:ext uri="{91240B29-F687-4f45-9708-019B960494DF}">
-                  <a14:hiddenLine xmlns="" xmlns:a14="http://schemas.microsoft.com/office/drawing/2010/main" w="9525">
+                  <a14:hiddenLine xmlns:a14="http://schemas.microsoft.com/office/drawing/2010/main" xmlns="" w="9525">
                     <a:solidFill>
                       <a:srgbClr val="000000"/>
                     </a:solidFill>
@@ -10461,7 +10461,7 @@
               </a:ln>
               <a:extLst>
                 <a:ext uri="{91240B29-F687-4f45-9708-019B960494DF}">
-                  <a14:hiddenLine xmlns="" xmlns:a14="http://schemas.microsoft.com/office/drawing/2010/main" w="9525">
+                  <a14:hiddenLine xmlns:a14="http://schemas.microsoft.com/office/drawing/2010/main" xmlns="" w="9525">
                     <a:solidFill>
                       <a:srgbClr val="000000"/>
                     </a:solidFill>
@@ -10551,7 +10551,7 @@
               </a:ln>
               <a:extLst>
                 <a:ext uri="{91240B29-F687-4f45-9708-019B960494DF}">
-                  <a14:hiddenLine xmlns="" xmlns:a14="http://schemas.microsoft.com/office/drawing/2010/main" w="9525">
+                  <a14:hiddenLine xmlns:a14="http://schemas.microsoft.com/office/drawing/2010/main" xmlns="" w="9525">
                     <a:solidFill>
                       <a:srgbClr val="000000"/>
                     </a:solidFill>
@@ -10613,7 +10613,7 @@
               </a:ln>
               <a:extLst>
                 <a:ext uri="{91240B29-F687-4f45-9708-019B960494DF}">
-                  <a14:hiddenLine xmlns="" xmlns:a14="http://schemas.microsoft.com/office/drawing/2010/main" w="9525">
+                  <a14:hiddenLine xmlns:a14="http://schemas.microsoft.com/office/drawing/2010/main" xmlns="" w="9525">
                     <a:solidFill>
                       <a:srgbClr val="000000"/>
                     </a:solidFill>
@@ -10703,7 +10703,7 @@
               </a:ln>
               <a:extLst>
                 <a:ext uri="{91240B29-F687-4f45-9708-019B960494DF}">
-                  <a14:hiddenLine xmlns="" xmlns:a14="http://schemas.microsoft.com/office/drawing/2010/main" w="9525">
+                  <a14:hiddenLine xmlns:a14="http://schemas.microsoft.com/office/drawing/2010/main" xmlns="" w="9525">
                     <a:solidFill>
                       <a:srgbClr val="000000"/>
                     </a:solidFill>
@@ -10768,7 +10768,7 @@
               </a:ln>
               <a:extLst>
                 <a:ext uri="{91240B29-F687-4f45-9708-019B960494DF}">
-                  <a14:hiddenLine xmlns="" xmlns:a14="http://schemas.microsoft.com/office/drawing/2010/main" w="9525">
+                  <a14:hiddenLine xmlns:a14="http://schemas.microsoft.com/office/drawing/2010/main" xmlns="" w="9525">
                     <a:solidFill>
                       <a:srgbClr val="000000"/>
                     </a:solidFill>
@@ -10830,7 +10830,7 @@
               </a:ln>
               <a:extLst>
                 <a:ext uri="{91240B29-F687-4f45-9708-019B960494DF}">
-                  <a14:hiddenLine xmlns="" xmlns:a14="http://schemas.microsoft.com/office/drawing/2010/main" w="9525">
+                  <a14:hiddenLine xmlns:a14="http://schemas.microsoft.com/office/drawing/2010/main" xmlns="" w="9525">
                     <a:solidFill>
                       <a:srgbClr val="000000"/>
                     </a:solidFill>
@@ -10920,7 +10920,7 @@
               </a:ln>
               <a:extLst>
                 <a:ext uri="{91240B29-F687-4f45-9708-019B960494DF}">
-                  <a14:hiddenLine xmlns="" xmlns:a14="http://schemas.microsoft.com/office/drawing/2010/main" w="9525">
+                  <a14:hiddenLine xmlns:a14="http://schemas.microsoft.com/office/drawing/2010/main" xmlns="" w="9525">
                     <a:solidFill>
                       <a:srgbClr val="000000"/>
                     </a:solidFill>
@@ -11010,7 +11010,7 @@
               </a:ln>
               <a:extLst>
                 <a:ext uri="{91240B29-F687-4f45-9708-019B960494DF}">
-                  <a14:hiddenLine xmlns="" xmlns:a14="http://schemas.microsoft.com/office/drawing/2010/main" w="9525">
+                  <a14:hiddenLine xmlns:a14="http://schemas.microsoft.com/office/drawing/2010/main" xmlns="" w="9525">
                     <a:solidFill>
                       <a:srgbClr val="000000"/>
                     </a:solidFill>
@@ -11075,7 +11075,7 @@
               </a:ln>
               <a:extLst>
                 <a:ext uri="{91240B29-F687-4f45-9708-019B960494DF}">
-                  <a14:hiddenLine xmlns="" xmlns:a14="http://schemas.microsoft.com/office/drawing/2010/main" w="9525">
+                  <a14:hiddenLine xmlns:a14="http://schemas.microsoft.com/office/drawing/2010/main" xmlns="" w="9525">
                     <a:solidFill>
                       <a:srgbClr val="000000"/>
                     </a:solidFill>
@@ -11195,7 +11195,7 @@
               </a:ln>
               <a:extLst>
                 <a:ext uri="{91240B29-F687-4f45-9708-019B960494DF}">
-                  <a14:hiddenLine xmlns="" xmlns:a14="http://schemas.microsoft.com/office/drawing/2010/main" w="9525">
+                  <a14:hiddenLine xmlns:a14="http://schemas.microsoft.com/office/drawing/2010/main" xmlns="" w="9525">
                     <a:solidFill>
                       <a:srgbClr val="000000"/>
                     </a:solidFill>
@@ -11293,7 +11293,7 @@
               </a:ln>
               <a:extLst>
                 <a:ext uri="{91240B29-F687-4f45-9708-019B960494DF}">
-                  <a14:hiddenLine xmlns="" xmlns:a14="http://schemas.microsoft.com/office/drawing/2010/main" w="9525">
+                  <a14:hiddenLine xmlns:a14="http://schemas.microsoft.com/office/drawing/2010/main" xmlns="" w="9525">
                     <a:solidFill>
                       <a:srgbClr val="000000"/>
                     </a:solidFill>
@@ -11408,7 +11408,7 @@
               </a:ln>
               <a:extLst>
                 <a:ext uri="{91240B29-F687-4f45-9708-019B960494DF}">
-                  <a14:hiddenLine xmlns="" xmlns:a14="http://schemas.microsoft.com/office/drawing/2010/main" w="9525">
+                  <a14:hiddenLine xmlns:a14="http://schemas.microsoft.com/office/drawing/2010/main" xmlns="" w="9525">
                     <a:solidFill>
                       <a:srgbClr val="000000"/>
                     </a:solidFill>
@@ -11498,7 +11498,7 @@
               </a:ln>
               <a:extLst>
                 <a:ext uri="{91240B29-F687-4f45-9708-019B960494DF}">
-                  <a14:hiddenLine xmlns="" xmlns:a14="http://schemas.microsoft.com/office/drawing/2010/main" w="9525">
+                  <a14:hiddenLine xmlns:a14="http://schemas.microsoft.com/office/drawing/2010/main" xmlns="" w="9525">
                     <a:solidFill>
                       <a:srgbClr val="000000"/>
                     </a:solidFill>
@@ -11563,7 +11563,7 @@
               </a:ln>
               <a:extLst>
                 <a:ext uri="{91240B29-F687-4f45-9708-019B960494DF}">
-                  <a14:hiddenLine xmlns="" xmlns:a14="http://schemas.microsoft.com/office/drawing/2010/main" w="9525">
+                  <a14:hiddenLine xmlns:a14="http://schemas.microsoft.com/office/drawing/2010/main" xmlns="" w="9525">
                     <a:solidFill>
                       <a:srgbClr val="000000"/>
                     </a:solidFill>
@@ -11653,7 +11653,7 @@
               </a:ln>
               <a:extLst>
                 <a:ext uri="{91240B29-F687-4f45-9708-019B960494DF}">
-                  <a14:hiddenLine xmlns="" xmlns:a14="http://schemas.microsoft.com/office/drawing/2010/main" w="9525">
+                  <a14:hiddenLine xmlns:a14="http://schemas.microsoft.com/office/drawing/2010/main" xmlns="" w="9525">
                     <a:solidFill>
                       <a:srgbClr val="000000"/>
                     </a:solidFill>
@@ -11721,7 +11721,7 @@
               </a:ln>
               <a:extLst>
                 <a:ext uri="{91240B29-F687-4f45-9708-019B960494DF}">
-                  <a14:hiddenLine xmlns="" xmlns:a14="http://schemas.microsoft.com/office/drawing/2010/main" w="9525">
+                  <a14:hiddenLine xmlns:a14="http://schemas.microsoft.com/office/drawing/2010/main" xmlns="" w="9525">
                     <a:solidFill>
                       <a:srgbClr val="000000"/>
                     </a:solidFill>
@@ -11811,7 +11811,7 @@
               </a:ln>
               <a:extLst>
                 <a:ext uri="{91240B29-F687-4f45-9708-019B960494DF}">
-                  <a14:hiddenLine xmlns="" xmlns:a14="http://schemas.microsoft.com/office/drawing/2010/main" w="9525">
+                  <a14:hiddenLine xmlns:a14="http://schemas.microsoft.com/office/drawing/2010/main" xmlns="" w="9525">
                     <a:solidFill>
                       <a:srgbClr val="000000"/>
                     </a:solidFill>
@@ -11879,7 +11879,7 @@
               </a:ln>
               <a:extLst>
                 <a:ext uri="{91240B29-F687-4f45-9708-019B960494DF}">
-                  <a14:hiddenLine xmlns="" xmlns:a14="http://schemas.microsoft.com/office/drawing/2010/main" w="9525">
+                  <a14:hiddenLine xmlns:a14="http://schemas.microsoft.com/office/drawing/2010/main" xmlns="" w="9525">
                     <a:solidFill>
                       <a:srgbClr val="000000"/>
                     </a:solidFill>
@@ -11969,7 +11969,7 @@
               </a:ln>
               <a:extLst>
                 <a:ext uri="{91240B29-F687-4f45-9708-019B960494DF}">
-                  <a14:hiddenLine xmlns="" xmlns:a14="http://schemas.microsoft.com/office/drawing/2010/main" w="9525">
+                  <a14:hiddenLine xmlns:a14="http://schemas.microsoft.com/office/drawing/2010/main" xmlns="" w="9525">
                     <a:solidFill>
                       <a:srgbClr val="000000"/>
                     </a:solidFill>
@@ -12003,7 +12003,7 @@
               </a:ln>
               <a:extLst>
                 <a:ext uri="{91240B29-F687-4f45-9708-019B960494DF}">
-                  <a14:hiddenLine xmlns="" xmlns:a14="http://schemas.microsoft.com/office/drawing/2010/main" w="9525">
+                  <a14:hiddenLine xmlns:a14="http://schemas.microsoft.com/office/drawing/2010/main" xmlns="" w="9525">
                     <a:solidFill>
                       <a:srgbClr val="000000"/>
                     </a:solidFill>
@@ -12143,7 +12143,7 @@
           <a:p>
             <a:fld id="{3CBC1C18-307B-4F68-A007-B5B542270E8D}" type="datetimeFigureOut">
               <a:rPr lang="en-US" smtClean="0"/>
-              <a:t>3/6/20</a:t>
+              <a:t>3/9/20</a:t>
             </a:fld>
             <a:endParaRPr lang="en-US" dirty="0"/>
           </a:p>
@@ -12575,7 +12575,7 @@
           <p:cNvPr id="2" name="Titel 1">
             <a:extLst>
               <a:ext uri="{FF2B5EF4-FFF2-40B4-BE49-F238E27FC236}">
-                <a16:creationId xmlns:a16="http://schemas.microsoft.com/office/drawing/2014/main" xmlns="" id="{EE60B694-AC50-3844-B32E-82E1AC3A4ADC}"/>
+                <a16:creationId xmlns:a16="http://schemas.microsoft.com/office/drawing/2014/main" id="{EE60B694-AC50-3844-B32E-82E1AC3A4ADC}"/>
               </a:ext>
             </a:extLst>
           </p:cNvPr>
@@ -12616,7 +12616,7 @@
           <p:cNvPr id="3" name="Untertitel 2">
             <a:extLst>
               <a:ext uri="{FF2B5EF4-FFF2-40B4-BE49-F238E27FC236}">
-                <a16:creationId xmlns:a16="http://schemas.microsoft.com/office/drawing/2014/main" xmlns="" id="{181FED3C-ADC9-524D-BFB5-BB1EFC503FBC}"/>
+                <a16:creationId xmlns:a16="http://schemas.microsoft.com/office/drawing/2014/main" id="{181FED3C-ADC9-524D-BFB5-BB1EFC503FBC}"/>
               </a:ext>
             </a:extLst>
           </p:cNvPr>
@@ -12662,13 +12662,6 @@
   <p:clrMapOvr>
     <a:masterClrMapping/>
   </p:clrMapOvr>
-  <p:timing>
-    <p:tnLst>
-      <p:par>
-        <p:cTn id="1" dur="indefinite" restart="never" nodeType="tmRoot"/>
-      </p:par>
-    </p:tnLst>
-  </p:timing>
 </p:sld>
 </file>
 
@@ -14801,18 +14794,13 @@
             <a:p>
               <a:pPr algn="ctr"/>
               <a:r>
-                <a:rPr lang="de-CH" sz="1600" b="1" dirty="0" err="1">
+                <a:rPr lang="de-CH" sz="1400" b="1" dirty="0">
                   <a:solidFill>
                     <a:schemeClr val="tx1"/>
                   </a:solidFill>
                 </a:rPr>
-                <a:t>Hippy</a:t>
+                <a:t>Hippie</a:t>
               </a:r>
-              <a:endParaRPr lang="de-CH" sz="1600" b="1" dirty="0">
-                <a:solidFill>
-                  <a:schemeClr val="tx1"/>
-                </a:solidFill>
-              </a:endParaRPr>
             </a:p>
           </p:txBody>
         </p:sp>
@@ -14827,13 +14815,6 @@
   <p:clrMapOvr>
     <a:masterClrMapping/>
   </p:clrMapOvr>
-  <p:timing>
-    <p:tnLst>
-      <p:par>
-        <p:cTn id="1" dur="indefinite" restart="never" nodeType="tmRoot"/>
-      </p:par>
-    </p:tnLst>
-  </p:timing>
 </p:sld>
 </file>
 
@@ -15551,18 +15532,13 @@
             <a:p>
               <a:pPr algn="ctr"/>
               <a:r>
-                <a:rPr lang="de-CH" sz="1600" b="1" dirty="0" err="1">
+                <a:rPr lang="de-CH" sz="1400" b="1" dirty="0">
                   <a:solidFill>
                     <a:schemeClr val="tx1"/>
                   </a:solidFill>
                 </a:rPr>
-                <a:t>Hippy</a:t>
+                <a:t>Hippie</a:t>
               </a:r>
-              <a:endParaRPr lang="de-CH" sz="1600" b="1" dirty="0">
-                <a:solidFill>
-                  <a:schemeClr val="tx1"/>
-                </a:solidFill>
-              </a:endParaRPr>
             </a:p>
           </p:txBody>
         </p:sp>
@@ -15751,13 +15727,6 @@
   <p:clrMapOvr>
     <a:masterClrMapping/>
   </p:clrMapOvr>
-  <p:timing>
-    <p:tnLst>
-      <p:par>
-        <p:cTn id="1" dur="indefinite" restart="never" nodeType="tmRoot"/>
-      </p:par>
-    </p:tnLst>
-  </p:timing>
 </p:sld>
 </file>
 
@@ -16247,18 +16216,13 @@
               <a:p>
                 <a:pPr algn="ctr"/>
                 <a:r>
-                  <a:rPr lang="de-CH" sz="1600" b="1" dirty="0" err="1">
+                  <a:rPr lang="de-CH" sz="1400" b="1" dirty="0">
                     <a:solidFill>
                       <a:schemeClr val="tx1"/>
                     </a:solidFill>
                   </a:rPr>
-                  <a:t>Hippy</a:t>
+                  <a:t>Hippie</a:t>
                 </a:r>
-                <a:endParaRPr lang="de-CH" sz="1600" b="1" dirty="0">
-                  <a:solidFill>
-                    <a:schemeClr val="tx1"/>
-                  </a:solidFill>
-                </a:endParaRPr>
               </a:p>
             </p:txBody>
           </p:sp>
@@ -16688,13 +16652,6 @@
   <p:clrMapOvr>
     <a:masterClrMapping/>
   </p:clrMapOvr>
-  <p:timing>
-    <p:tnLst>
-      <p:par>
-        <p:cTn id="1" dur="indefinite" restart="never" nodeType="tmRoot"/>
-      </p:par>
-    </p:tnLst>
-  </p:timing>
 </p:sld>
 </file>
 
@@ -17022,15 +16979,7 @@
                   <a:schemeClr val="bg1"/>
                 </a:solidFill>
               </a:rPr>
-              <a:t>Mei:	</a:t>
-            </a:r>
-            <a:r>
-              <a:rPr lang="de-CH" sz="1600" dirty="0" smtClean="0">
-                <a:solidFill>
-                  <a:schemeClr val="bg1"/>
-                </a:solidFill>
-              </a:rPr>
-              <a:t>	0 </a:t>
+              <a:t>Mei:		0 </a:t>
             </a:r>
             <a:r>
               <a:rPr lang="de-CH" sz="1600" dirty="0" err="1">
@@ -17449,10 +17398,9 @@
             <a:p>
               <a:pPr algn="ctr"/>
               <a:r>
-                <a:rPr lang="de-CH" sz="1200" dirty="0" smtClean="0"/>
+                <a:rPr lang="de-CH" sz="1200" dirty="0"/>
                 <a:t>10</a:t>
               </a:r>
-              <a:endParaRPr lang="de-CH" sz="1200" dirty="0"/>
             </a:p>
           </p:txBody>
         </p:sp>
@@ -17502,13 +17450,6 @@
   <p:clrMapOvr>
     <a:masterClrMapping/>
   </p:clrMapOvr>
-  <p:timing>
-    <p:tnLst>
-      <p:par>
-        <p:cTn id="1" dur="indefinite" restart="never" nodeType="tmRoot"/>
-      </p:par>
-    </p:tnLst>
-  </p:timing>
 </p:sld>
 </file>
 
@@ -17768,21 +17709,8 @@
                   <a:schemeClr val="bg1"/>
                 </a:solidFill>
               </a:rPr>
-              <a:t> </a:t>
-            </a:r>
-            <a:r>
-              <a:rPr lang="de-CH" sz="1600" dirty="0" smtClean="0">
-                <a:solidFill>
-                  <a:schemeClr val="bg1"/>
-                </a:solidFill>
-              </a:rPr>
-              <a:t>^^</a:t>
-            </a:r>
-            <a:endParaRPr lang="de-CH" sz="1600" dirty="0">
-              <a:solidFill>
-                <a:schemeClr val="bg1"/>
-              </a:solidFill>
-            </a:endParaRPr>
+              <a:t> ^^</a:t>
+            </a:r>
           </a:p>
         </p:txBody>
       </p:sp>
@@ -17930,15 +17858,7 @@
                   <a:schemeClr val="bg1"/>
                 </a:solidFill>
               </a:rPr>
-              <a:t>Mei:	</a:t>
-            </a:r>
-            <a:r>
-              <a:rPr lang="de-CH" sz="1600" dirty="0" smtClean="0">
-                <a:solidFill>
-                  <a:schemeClr val="bg1"/>
-                </a:solidFill>
-              </a:rPr>
-              <a:t>	0 </a:t>
+              <a:t>Mei:		0 </a:t>
             </a:r>
             <a:r>
               <a:rPr lang="de-CH" sz="1600" dirty="0" err="1">
@@ -18594,10 +18514,9 @@
             <a:p>
               <a:pPr algn="ctr"/>
               <a:r>
-                <a:rPr lang="de-CH" sz="1200" dirty="0" smtClean="0"/>
+                <a:rPr lang="de-CH" sz="1200" dirty="0"/>
                 <a:t>10</a:t>
               </a:r>
-              <a:endParaRPr lang="de-CH" sz="1200" dirty="0"/>
             </a:p>
           </p:txBody>
         </p:sp>
@@ -19759,15 +19678,7 @@
                   <a:schemeClr val="bg1"/>
                 </a:solidFill>
               </a:rPr>
-              <a:t>Mei:	</a:t>
-            </a:r>
-            <a:r>
-              <a:rPr lang="de-CH" sz="1600" dirty="0" smtClean="0">
-                <a:solidFill>
-                  <a:schemeClr val="bg1"/>
-                </a:solidFill>
-              </a:rPr>
-              <a:t>	0 </a:t>
+              <a:t>Mei:		0 </a:t>
             </a:r>
             <a:r>
               <a:rPr lang="de-CH" sz="1600" dirty="0" err="1">
@@ -20810,10 +20721,9 @@
             <a:p>
               <a:pPr algn="ctr"/>
               <a:r>
-                <a:rPr lang="de-CH" sz="1200" dirty="0" smtClean="0"/>
+                <a:rPr lang="de-CH" sz="1200" dirty="0"/>
                 <a:t>10</a:t>
               </a:r>
-              <a:endParaRPr lang="de-CH" sz="1200" dirty="0"/>
             </a:p>
           </p:txBody>
         </p:sp>
@@ -20863,13 +20773,6 @@
   <p:clrMapOvr>
     <a:masterClrMapping/>
   </p:clrMapOvr>
-  <p:timing>
-    <p:tnLst>
-      <p:par>
-        <p:cTn id="1" dur="indefinite" restart="never" nodeType="tmRoot"/>
-      </p:par>
-    </p:tnLst>
-  </p:timing>
 </p:sld>
 </file>
 
@@ -21285,15 +21188,7 @@
                   <a:schemeClr val="bg1"/>
                 </a:solidFill>
               </a:rPr>
-              <a:t>Mei:	</a:t>
-            </a:r>
-            <a:r>
-              <a:rPr lang="de-CH" sz="1600" dirty="0" smtClean="0">
-                <a:solidFill>
-                  <a:schemeClr val="bg1"/>
-                </a:solidFill>
-              </a:rPr>
-              <a:t>	0 </a:t>
+              <a:t>Mei:		0 </a:t>
             </a:r>
             <a:r>
               <a:rPr lang="de-CH" sz="1600" dirty="0" err="1">
@@ -22451,10 +22346,9 @@
             <a:p>
               <a:pPr algn="ctr"/>
               <a:r>
-                <a:rPr lang="de-CH" sz="1200" dirty="0" smtClean="0"/>
+                <a:rPr lang="de-CH" sz="1200" dirty="0"/>
                 <a:t>10</a:t>
               </a:r>
-              <a:endParaRPr lang="de-CH" sz="1200" dirty="0"/>
             </a:p>
           </p:txBody>
         </p:sp>
@@ -22504,13 +22398,6 @@
   <p:clrMapOvr>
     <a:masterClrMapping/>
   </p:clrMapOvr>
-  <p:timing>
-    <p:tnLst>
-      <p:par>
-        <p:cTn id="1" dur="indefinite" restart="never" nodeType="tmRoot"/>
-      </p:par>
-    </p:tnLst>
-  </p:timing>
 </p:sld>
 </file>
 
@@ -22934,15 +22821,7 @@
                   <a:schemeClr val="bg1"/>
                 </a:solidFill>
               </a:rPr>
-              <a:t>Mei:	</a:t>
-            </a:r>
-            <a:r>
-              <a:rPr lang="de-CH" sz="1600" dirty="0" smtClean="0">
-                <a:solidFill>
-                  <a:schemeClr val="bg1"/>
-                </a:solidFill>
-              </a:rPr>
-              <a:t>	0 </a:t>
+              <a:t>Mei:		0 </a:t>
             </a:r>
             <a:r>
               <a:rPr lang="de-CH" sz="1600" dirty="0" err="1">
@@ -24108,10 +23987,9 @@
             <a:p>
               <a:pPr algn="ctr"/>
               <a:r>
-                <a:rPr lang="de-CH" sz="1200" dirty="0" smtClean="0"/>
+                <a:rPr lang="de-CH" sz="1200" dirty="0"/>
                 <a:t>10</a:t>
               </a:r>
-              <a:endParaRPr lang="de-CH" sz="1200" dirty="0"/>
             </a:p>
           </p:txBody>
         </p:sp>
@@ -24161,13 +24039,6 @@
   <p:clrMapOvr>
     <a:masterClrMapping/>
   </p:clrMapOvr>
-  <p:timing>
-    <p:tnLst>
-      <p:par>
-        <p:cTn id="1" dur="indefinite" restart="never" nodeType="tmRoot"/>
-      </p:par>
-    </p:tnLst>
-  </p:timing>
 </p:sld>
 </file>
 
@@ -24193,7 +24064,7 @@
           <p:cNvPr id="2" name="Titel 1">
             <a:extLst>
               <a:ext uri="{FF2B5EF4-FFF2-40B4-BE49-F238E27FC236}">
-                <a16:creationId xmlns:a16="http://schemas.microsoft.com/office/drawing/2014/main" xmlns="" id="{D160F170-6247-1840-B5C6-D0D137BA9740}"/>
+                <a16:creationId xmlns:a16="http://schemas.microsoft.com/office/drawing/2014/main" id="{D160F170-6247-1840-B5C6-D0D137BA9740}"/>
               </a:ext>
             </a:extLst>
           </p:cNvPr>
@@ -24226,7 +24097,7 @@
           <p:cNvPr id="3" name="Inhaltsplatzhalter 2">
             <a:extLst>
               <a:ext uri="{FF2B5EF4-FFF2-40B4-BE49-F238E27FC236}">
-                <a16:creationId xmlns:a16="http://schemas.microsoft.com/office/drawing/2014/main" xmlns="" id="{46C43541-F3E5-6D43-A359-86280DFD53F2}"/>
+                <a16:creationId xmlns:a16="http://schemas.microsoft.com/office/drawing/2014/main" id="{46C43541-F3E5-6D43-A359-86280DFD53F2}"/>
               </a:ext>
             </a:extLst>
           </p:cNvPr>
@@ -24300,13 +24171,6 @@
   <p:clrMapOvr>
     <a:masterClrMapping/>
   </p:clrMapOvr>
-  <p:timing>
-    <p:tnLst>
-      <p:par>
-        <p:cTn id="1" dur="indefinite" restart="never" nodeType="tmRoot"/>
-      </p:par>
-    </p:tnLst>
-  </p:timing>
 </p:sld>
 </file>
 
@@ -24707,23 +24571,7 @@
                   <a:schemeClr val="bg1"/>
                 </a:solidFill>
               </a:rPr>
-              <a:t>Anna: 	</a:t>
-            </a:r>
-            <a:r>
-              <a:rPr lang="de-CH" sz="1600" dirty="0" smtClean="0">
-                <a:solidFill>
-                  <a:schemeClr val="bg1"/>
-                </a:solidFill>
-              </a:rPr>
-              <a:t>36</a:t>
-            </a:r>
-            <a:r>
-              <a:rPr lang="de-CH" sz="1600" dirty="0" smtClean="0">
-                <a:solidFill>
-                  <a:schemeClr val="bg1"/>
-                </a:solidFill>
-              </a:rPr>
-              <a:t>0 </a:t>
+              <a:t>Anna: 	360 </a:t>
             </a:r>
             <a:r>
               <a:rPr lang="de-CH" sz="1600" dirty="0" err="1">
@@ -24746,15 +24594,7 @@
                   <a:schemeClr val="bg1"/>
                 </a:solidFill>
               </a:rPr>
-              <a:t>Mei:	</a:t>
-            </a:r>
-            <a:r>
-              <a:rPr lang="de-CH" sz="1600" dirty="0" smtClean="0">
-                <a:solidFill>
-                  <a:schemeClr val="bg1"/>
-                </a:solidFill>
-              </a:rPr>
-              <a:t>	140 </a:t>
+              <a:t>Mei:		140 </a:t>
             </a:r>
             <a:r>
               <a:rPr lang="de-CH" sz="1600" dirty="0" err="1">
@@ -25757,18 +25597,13 @@
           <a:p>
             <a:pPr algn="ctr"/>
             <a:r>
-              <a:rPr lang="de-CH" i="1" dirty="0" smtClean="0">
+              <a:rPr lang="de-CH" i="1" dirty="0">
                 <a:solidFill>
                   <a:schemeClr val="bg1"/>
                 </a:solidFill>
               </a:rPr>
               <a:t>Nach einer Spielrunde </a:t>
             </a:r>
-            <a:endParaRPr lang="de-CH" i="1" dirty="0">
-              <a:solidFill>
-                <a:schemeClr val="bg1"/>
-              </a:solidFill>
-            </a:endParaRPr>
           </a:p>
         </p:txBody>
       </p:sp>
@@ -26158,10 +25993,9 @@
             <a:p>
               <a:pPr algn="ctr"/>
               <a:r>
-                <a:rPr lang="de-CH" sz="1200" dirty="0" smtClean="0"/>
+                <a:rPr lang="de-CH" sz="1200" dirty="0"/>
                 <a:t>10</a:t>
               </a:r>
-              <a:endParaRPr lang="de-CH" sz="1200" dirty="0"/>
             </a:p>
           </p:txBody>
         </p:sp>
@@ -26689,15 +26523,7 @@
                   <a:schemeClr val="bg1"/>
                 </a:solidFill>
               </a:rPr>
-              <a:t>Anna: 	</a:t>
-            </a:r>
-            <a:r>
-              <a:rPr lang="de-CH" sz="1600" dirty="0" smtClean="0">
-                <a:solidFill>
-                  <a:schemeClr val="bg1"/>
-                </a:solidFill>
-              </a:rPr>
-              <a:t>350 </a:t>
+              <a:t>Anna: 	350 </a:t>
             </a:r>
             <a:r>
               <a:rPr lang="de-CH" sz="1600" dirty="0" err="1">
@@ -26720,15 +26546,7 @@
                   <a:schemeClr val="bg1"/>
                 </a:solidFill>
               </a:rPr>
-              <a:t>Mei:	</a:t>
-            </a:r>
-            <a:r>
-              <a:rPr lang="de-CH" sz="1600" dirty="0" smtClean="0">
-                <a:solidFill>
-                  <a:schemeClr val="bg1"/>
-                </a:solidFill>
-              </a:rPr>
-              <a:t>	140 </a:t>
+              <a:t>Mei:		140 </a:t>
             </a:r>
             <a:r>
               <a:rPr lang="de-CH" sz="1600" dirty="0" err="1">
@@ -28131,10 +27949,9 @@
             <a:p>
               <a:pPr algn="ctr"/>
               <a:r>
-                <a:rPr lang="de-CH" sz="1200" dirty="0" smtClean="0"/>
+                <a:rPr lang="de-CH" sz="1200" dirty="0"/>
                 <a:t>10</a:t>
               </a:r>
-              <a:endParaRPr lang="de-CH" sz="1200" dirty="0"/>
             </a:p>
           </p:txBody>
         </p:sp>
@@ -28333,7 +28150,7 @@
           <p:cNvPr id="2" name="Titel 1">
             <a:extLst>
               <a:ext uri="{FF2B5EF4-FFF2-40B4-BE49-F238E27FC236}">
-                <a16:creationId xmlns:a16="http://schemas.microsoft.com/office/drawing/2014/main" xmlns="" id="{0BC03841-02CB-C047-AE91-FD2F5EC54DD5}"/>
+                <a16:creationId xmlns:a16="http://schemas.microsoft.com/office/drawing/2014/main" id="{0BC03841-02CB-C047-AE91-FD2F5EC54DD5}"/>
               </a:ext>
             </a:extLst>
           </p:cNvPr>
@@ -28361,7 +28178,7 @@
           <p:cNvPr id="3" name="Inhaltsplatzhalter 2">
             <a:extLst>
               <a:ext uri="{FF2B5EF4-FFF2-40B4-BE49-F238E27FC236}">
-                <a16:creationId xmlns:a16="http://schemas.microsoft.com/office/drawing/2014/main" xmlns="" id="{C8C3955F-84EF-024B-8F03-D7BD18821B31}"/>
+                <a16:creationId xmlns:a16="http://schemas.microsoft.com/office/drawing/2014/main" id="{C8C3955F-84EF-024B-8F03-D7BD18821B31}"/>
               </a:ext>
             </a:extLst>
           </p:cNvPr>
@@ -28849,7 +28666,7 @@
           <p:cNvPr id="2" name="Titel 1">
             <a:extLst>
               <a:ext uri="{FF2B5EF4-FFF2-40B4-BE49-F238E27FC236}">
-                <a16:creationId xmlns:a16="http://schemas.microsoft.com/office/drawing/2014/main" xmlns="" id="{67CDCE25-4C49-3F4A-8043-0325D65E56BA}"/>
+                <a16:creationId xmlns:a16="http://schemas.microsoft.com/office/drawing/2014/main" id="{67CDCE25-4C49-3F4A-8043-0325D65E56BA}"/>
               </a:ext>
             </a:extLst>
           </p:cNvPr>
@@ -28878,7 +28695,7 @@
           <p:cNvPr id="3" name="Inhaltsplatzhalter 2">
             <a:extLst>
               <a:ext uri="{FF2B5EF4-FFF2-40B4-BE49-F238E27FC236}">
-                <a16:creationId xmlns:a16="http://schemas.microsoft.com/office/drawing/2014/main" xmlns="" id="{68C650EC-7FD7-0D4F-81F5-F5C0D394A542}"/>
+                <a16:creationId xmlns:a16="http://schemas.microsoft.com/office/drawing/2014/main" id="{68C650EC-7FD7-0D4F-81F5-F5C0D394A542}"/>
               </a:ext>
             </a:extLst>
           </p:cNvPr>
@@ -29248,7 +29065,7 @@
           <p:cNvPr id="2" name="Titel 1">
             <a:extLst>
               <a:ext uri="{FF2B5EF4-FFF2-40B4-BE49-F238E27FC236}">
-                <a16:creationId xmlns:a16="http://schemas.microsoft.com/office/drawing/2014/main" xmlns="" id="{9C11DF2D-7981-2442-9502-48940D1C550B}"/>
+                <a16:creationId xmlns:a16="http://schemas.microsoft.com/office/drawing/2014/main" id="{9C11DF2D-7981-2442-9502-48940D1C550B}"/>
               </a:ext>
             </a:extLst>
           </p:cNvPr>
@@ -29277,7 +29094,7 @@
           <p:cNvPr id="3" name="Inhaltsplatzhalter 2">
             <a:extLst>
               <a:ext uri="{FF2B5EF4-FFF2-40B4-BE49-F238E27FC236}">
-                <a16:creationId xmlns:a16="http://schemas.microsoft.com/office/drawing/2014/main" xmlns="" id="{F58655C7-3D94-064B-B88F-19D266A32BE1}"/>
+                <a16:creationId xmlns:a16="http://schemas.microsoft.com/office/drawing/2014/main" id="{F58655C7-3D94-064B-B88F-19D266A32BE1}"/>
               </a:ext>
             </a:extLst>
           </p:cNvPr>
@@ -29323,6 +29140,13 @@
             <a:r>
               <a:rPr lang="de-DE" dirty="0"/>
               <a:t>Überträgt die Spielzüge an den Server</a:t>
+            </a:r>
+          </a:p>
+          <a:p>
+            <a:pPr lvl="1"/>
+            <a:r>
+              <a:rPr lang="de-DE" dirty="0"/>
+              <a:t>Via Protokoll</a:t>
             </a:r>
           </a:p>
           <a:p>
@@ -29560,6 +29384,55 @@
                       </p:childTnLst>
                     </p:cTn>
                   </p:par>
+                  <p:par>
+                    <p:cTn id="19" fill="hold">
+                      <p:stCondLst>
+                        <p:cond delay="indefinite"/>
+                      </p:stCondLst>
+                      <p:childTnLst>
+                        <p:par>
+                          <p:cTn id="20" fill="hold">
+                            <p:stCondLst>
+                              <p:cond delay="0"/>
+                            </p:stCondLst>
+                            <p:childTnLst>
+                              <p:par>
+                                <p:cTn id="21" presetID="1" presetClass="entr" presetSubtype="0" fill="hold" nodeType="clickEffect">
+                                  <p:stCondLst>
+                                    <p:cond delay="0"/>
+                                  </p:stCondLst>
+                                  <p:childTnLst>
+                                    <p:set>
+                                      <p:cBhvr>
+                                        <p:cTn id="22" dur="1" fill="hold">
+                                          <p:stCondLst>
+                                            <p:cond delay="0"/>
+                                          </p:stCondLst>
+                                        </p:cTn>
+                                        <p:tgtEl>
+                                          <p:spTgt spid="3">
+                                            <p:txEl>
+                                              <p:pRg st="5" end="5"/>
+                                            </p:txEl>
+                                          </p:spTgt>
+                                        </p:tgtEl>
+                                        <p:attrNameLst>
+                                          <p:attrName>style.visibility</p:attrName>
+                                        </p:attrNameLst>
+                                      </p:cBhvr>
+                                      <p:to>
+                                        <p:strVal val="visible"/>
+                                      </p:to>
+                                    </p:set>
+                                  </p:childTnLst>
+                                </p:cTn>
+                              </p:par>
+                            </p:childTnLst>
+                          </p:cTn>
+                        </p:par>
+                      </p:childTnLst>
+                    </p:cTn>
+                  </p:par>
                 </p:childTnLst>
               </p:cTn>
               <p:prevCondLst>
@@ -29607,7 +29480,7 @@
           <p:cNvPr id="2" name="Titel 1">
             <a:extLst>
               <a:ext uri="{FF2B5EF4-FFF2-40B4-BE49-F238E27FC236}">
-                <a16:creationId xmlns:a16="http://schemas.microsoft.com/office/drawing/2014/main" xmlns="" id="{BEC9EF60-B7F3-4D45-B772-642698EAD3F1}"/>
+                <a16:creationId xmlns:a16="http://schemas.microsoft.com/office/drawing/2014/main" id="{BEC9EF60-B7F3-4D45-B772-642698EAD3F1}"/>
               </a:ext>
             </a:extLst>
           </p:cNvPr>
@@ -29636,7 +29509,7 @@
           <p:cNvPr id="3" name="Inhaltsplatzhalter 2">
             <a:extLst>
               <a:ext uri="{FF2B5EF4-FFF2-40B4-BE49-F238E27FC236}">
-                <a16:creationId xmlns:a16="http://schemas.microsoft.com/office/drawing/2014/main" xmlns="" id="{C253C894-A10A-6948-A977-7538A9145706}"/>
+                <a16:creationId xmlns:a16="http://schemas.microsoft.com/office/drawing/2014/main" id="{C253C894-A10A-6948-A977-7538A9145706}"/>
               </a:ext>
             </a:extLst>
           </p:cNvPr>
@@ -29654,24 +29527,14 @@
           <a:p>
             <a:r>
               <a:rPr lang="de-DE" dirty="0"/>
-              <a:t>Tagebuch: </a:t>
-            </a:r>
-            <a:r>
-              <a:rPr lang="de-DE" dirty="0" smtClean="0"/>
-              <a:t>Johannes</a:t>
-            </a:r>
-            <a:endParaRPr lang="de-DE" dirty="0"/>
+              <a:t>Tagebuch: Johannes</a:t>
+            </a:r>
           </a:p>
           <a:p>
             <a:r>
               <a:rPr lang="de-DE" dirty="0"/>
-              <a:t>GUI: </a:t>
-            </a:r>
-            <a:r>
-              <a:rPr lang="de-DE" dirty="0" smtClean="0"/>
-              <a:t>Meipei, Anna</a:t>
-            </a:r>
-            <a:endParaRPr lang="de-DE" dirty="0"/>
+              <a:t>GUI: Meipei, Anna</a:t>
+            </a:r>
           </a:p>
           <a:p>
             <a:r>
@@ -29699,13 +29562,8 @@
           <a:p>
             <a:r>
               <a:rPr lang="de-DE" dirty="0"/>
-              <a:t>Handbuch: </a:t>
-            </a:r>
-            <a:r>
-              <a:rPr lang="de-DE" dirty="0" smtClean="0"/>
-              <a:t>Johannes</a:t>
-            </a:r>
-            <a:endParaRPr lang="de-DE" dirty="0"/>
+              <a:t>Handbuch: Johannes</a:t>
+            </a:r>
           </a:p>
         </p:txBody>
       </p:sp>
@@ -30068,7 +29926,7 @@
           <p:cNvPr id="2" name="Titel 1">
             <a:extLst>
               <a:ext uri="{FF2B5EF4-FFF2-40B4-BE49-F238E27FC236}">
-                <a16:creationId xmlns:a16="http://schemas.microsoft.com/office/drawing/2014/main" xmlns="" id="{58BD989A-247C-334B-98C4-BEA5BF24A922}"/>
+                <a16:creationId xmlns:a16="http://schemas.microsoft.com/office/drawing/2014/main" id="{58BD989A-247C-334B-98C4-BEA5BF24A922}"/>
               </a:ext>
             </a:extLst>
           </p:cNvPr>
@@ -30096,7 +29954,7 @@
           <p:cNvPr id="3" name="Inhaltsplatzhalter 2">
             <a:extLst>
               <a:ext uri="{FF2B5EF4-FFF2-40B4-BE49-F238E27FC236}">
-                <a16:creationId xmlns:a16="http://schemas.microsoft.com/office/drawing/2014/main" xmlns="" id="{486FDFB3-07DF-C143-A9B9-1CF12C0A2ACD}"/>
+                <a16:creationId xmlns:a16="http://schemas.microsoft.com/office/drawing/2014/main" id="{486FDFB3-07DF-C143-A9B9-1CF12C0A2ACD}"/>
               </a:ext>
             </a:extLst>
           </p:cNvPr>
@@ -30113,18 +29971,17 @@
           <a:lstStyle/>
           <a:p>
             <a:r>
-              <a:rPr lang="de-DE" dirty="0" smtClean="0"/>
+              <a:rPr lang="de-DE" dirty="0"/>
               <a:t>WhatsApp/</a:t>
             </a:r>
             <a:r>
-              <a:rPr lang="de-DE" dirty="0" err="1" smtClean="0"/>
+              <a:rPr lang="de-DE" dirty="0" err="1"/>
               <a:t>Discord</a:t>
             </a:r>
             <a:r>
-              <a:rPr lang="de-DE" dirty="0" smtClean="0"/>
+              <a:rPr lang="de-DE" dirty="0"/>
               <a:t>, Skype</a:t>
             </a:r>
-            <a:endParaRPr lang="de-DE" dirty="0"/>
           </a:p>
           <a:p>
             <a:r>
@@ -30369,7 +30226,7 @@
           <p:cNvPr id="2" name="Titel 1">
             <a:extLst>
               <a:ext uri="{FF2B5EF4-FFF2-40B4-BE49-F238E27FC236}">
-                <a16:creationId xmlns:a16="http://schemas.microsoft.com/office/drawing/2014/main" xmlns="" id="{A9DB09D8-C533-4347-99F4-1DFCA12240E5}"/>
+                <a16:creationId xmlns:a16="http://schemas.microsoft.com/office/drawing/2014/main" id="{A9DB09D8-C533-4347-99F4-1DFCA12240E5}"/>
               </a:ext>
             </a:extLst>
           </p:cNvPr>
@@ -30398,7 +30255,7 @@
           <p:cNvPr id="3" name="Inhaltsplatzhalter 2">
             <a:extLst>
               <a:ext uri="{FF2B5EF4-FFF2-40B4-BE49-F238E27FC236}">
-                <a16:creationId xmlns:a16="http://schemas.microsoft.com/office/drawing/2014/main" xmlns="" id="{4066DF28-1C69-6D44-9D65-3D3CE2042E84}"/>
+                <a16:creationId xmlns:a16="http://schemas.microsoft.com/office/drawing/2014/main" id="{4066DF28-1C69-6D44-9D65-3D3CE2042E84}"/>
               </a:ext>
             </a:extLst>
           </p:cNvPr>
@@ -30428,21 +30285,13 @@
           <a:p>
             <a:r>
               <a:rPr lang="de-CH" dirty="0"/>
-              <a:t>https://</a:t>
-            </a:r>
-            <a:r>
-              <a:rPr lang="de-CH" dirty="0" smtClean="0"/>
-              <a:t>image.shutterstock.com/image-photo/playing-cards-hand-isolated-on-260nw-397538776.jpg</a:t>
+              <a:t>https://image.shutterstock.com/image-photo/playing-cards-hand-isolated-on-260nw-397538776.jpg</a:t>
             </a:r>
           </a:p>
           <a:p>
             <a:r>
               <a:rPr lang="de-CH" dirty="0"/>
-              <a:t>https://</a:t>
-            </a:r>
-            <a:r>
-              <a:rPr lang="de-CH" dirty="0" smtClean="0"/>
-              <a:t>de.cleanpng.com/png-o67csq/preview.html</a:t>
+              <a:t>https://de.cleanpng.com/png-o67csq/preview.html</a:t>
             </a:r>
           </a:p>
           <a:p>
@@ -30463,13 +30312,6 @@
   <p:clrMapOvr>
     <a:masterClrMapping/>
   </p:clrMapOvr>
-  <p:timing>
-    <p:tnLst>
-      <p:par>
-        <p:cTn id="1" dur="indefinite" restart="never" nodeType="tmRoot"/>
-      </p:par>
-    </p:tnLst>
-  </p:timing>
 </p:sld>
 </file>
 
@@ -30495,7 +30337,7 @@
           <p:cNvPr id="2" name="Titel 1">
             <a:extLst>
               <a:ext uri="{FF2B5EF4-FFF2-40B4-BE49-F238E27FC236}">
-                <a16:creationId xmlns:a16="http://schemas.microsoft.com/office/drawing/2014/main" xmlns="" id="{0ABAC4F0-599E-C84B-BFD7-F0FDAD0E7B7E}"/>
+                <a16:creationId xmlns:a16="http://schemas.microsoft.com/office/drawing/2014/main" id="{6110DCC2-8A8F-C240-BA6A-BDD8B345BBBF}"/>
               </a:ext>
             </a:extLst>
           </p:cNvPr>
@@ -30508,8 +30350,8 @@
         </p:nvSpPr>
         <p:spPr>
           <a:xfrm>
-            <a:off x="4105330" y="2268643"/>
-            <a:ext cx="9905998" cy="1478570"/>
+            <a:off x="1060506" y="1364753"/>
+            <a:ext cx="11131494" cy="3606640"/>
           </a:xfrm>
         </p:spPr>
         <p:txBody>
@@ -30519,8 +30361,8 @@
           <a:lstStyle/>
           <a:p>
             <a:r>
-              <a:rPr lang="de-DE" sz="5400" dirty="0"/>
-              <a:t>Fragen?</a:t>
+              <a:rPr lang="de-DE" sz="4400" dirty="0"/>
+              <a:t>Vielen dank für eure Aufmerksamkeit!</a:t>
             </a:r>
           </a:p>
         </p:txBody>
@@ -30528,20 +30370,13 @@
     </p:spTree>
     <p:extLst>
       <p:ext uri="{BB962C8B-B14F-4D97-AF65-F5344CB8AC3E}">
-        <p14:creationId xmlns:p14="http://schemas.microsoft.com/office/powerpoint/2010/main" val="1940052306"/>
+        <p14:creationId xmlns:p14="http://schemas.microsoft.com/office/powerpoint/2010/main" val="245925274"/>
       </p:ext>
     </p:extLst>
   </p:cSld>
   <p:clrMapOvr>
     <a:masterClrMapping/>
   </p:clrMapOvr>
-  <p:timing>
-    <p:tnLst>
-      <p:par>
-        <p:cTn id="1" dur="indefinite" restart="never" nodeType="tmRoot"/>
-      </p:par>
-    </p:tnLst>
-  </p:timing>
 </p:sld>
 </file>
 
@@ -30567,7 +30402,7 @@
           <p:cNvPr id="2" name="Titel 1">
             <a:extLst>
               <a:ext uri="{FF2B5EF4-FFF2-40B4-BE49-F238E27FC236}">
-                <a16:creationId xmlns:a16="http://schemas.microsoft.com/office/drawing/2014/main" xmlns="" id="{6110DCC2-8A8F-C240-BA6A-BDD8B345BBBF}"/>
+                <a16:creationId xmlns:a16="http://schemas.microsoft.com/office/drawing/2014/main" id="{0ABAC4F0-599E-C84B-BFD7-F0FDAD0E7B7E}"/>
               </a:ext>
             </a:extLst>
           </p:cNvPr>
@@ -30580,8 +30415,8 @@
         </p:nvSpPr>
         <p:spPr>
           <a:xfrm>
-            <a:off x="1060506" y="1364753"/>
-            <a:ext cx="11131494" cy="3606640"/>
+            <a:off x="4105330" y="2268643"/>
+            <a:ext cx="9905998" cy="1478570"/>
           </a:xfrm>
         </p:spPr>
         <p:txBody>
@@ -30591,8 +30426,8 @@
           <a:lstStyle/>
           <a:p>
             <a:r>
-              <a:rPr lang="de-DE" sz="4400" dirty="0"/>
-              <a:t>Vielen dank für eure Aufmerksamkeit!</a:t>
+              <a:rPr lang="de-DE" sz="5400" dirty="0"/>
+              <a:t>Fragen?</a:t>
             </a:r>
           </a:p>
         </p:txBody>
@@ -30600,20 +30435,13 @@
     </p:spTree>
     <p:extLst>
       <p:ext uri="{BB962C8B-B14F-4D97-AF65-F5344CB8AC3E}">
-        <p14:creationId xmlns:p14="http://schemas.microsoft.com/office/powerpoint/2010/main" val="245925274"/>
+        <p14:creationId xmlns:p14="http://schemas.microsoft.com/office/powerpoint/2010/main" val="1940052306"/>
       </p:ext>
     </p:extLst>
   </p:cSld>
   <p:clrMapOvr>
     <a:masterClrMapping/>
   </p:clrMapOvr>
-  <p:timing>
-    <p:tnLst>
-      <p:par>
-        <p:cTn id="1" dur="indefinite" restart="never" nodeType="tmRoot"/>
-      </p:par>
-    </p:tnLst>
-  </p:timing>
 </p:sld>
 </file>
 
@@ -30639,7 +30467,7 @@
           <p:cNvPr id="2" name="Titel 1">
             <a:extLst>
               <a:ext uri="{FF2B5EF4-FFF2-40B4-BE49-F238E27FC236}">
-                <a16:creationId xmlns:a16="http://schemas.microsoft.com/office/drawing/2014/main" xmlns="" id="{E50D757A-0022-8846-A9B3-07DC3F49537E}"/>
+                <a16:creationId xmlns:a16="http://schemas.microsoft.com/office/drawing/2014/main" id="{E50D757A-0022-8846-A9B3-07DC3F49537E}"/>
               </a:ext>
             </a:extLst>
           </p:cNvPr>
@@ -30667,7 +30495,7 @@
           <p:cNvPr id="3" name="Inhaltsplatzhalter 2">
             <a:extLst>
               <a:ext uri="{FF2B5EF4-FFF2-40B4-BE49-F238E27FC236}">
-                <a16:creationId xmlns:a16="http://schemas.microsoft.com/office/drawing/2014/main" xmlns="" id="{46E573F9-8531-5D4A-BD5A-972B6BBE3338}"/>
+                <a16:creationId xmlns:a16="http://schemas.microsoft.com/office/drawing/2014/main" id="{46E573F9-8531-5D4A-BD5A-972B6BBE3338}"/>
               </a:ext>
             </a:extLst>
           </p:cNvPr>
@@ -30691,26 +30519,25 @@
           <a:lstStyle/>
           <a:p>
             <a:r>
-              <a:rPr lang="de-DE" dirty="0" smtClean="0"/>
+              <a:rPr lang="de-DE" dirty="0"/>
               <a:t>Unsere Spielidee</a:t>
             </a:r>
           </a:p>
           <a:p>
             <a:r>
-              <a:rPr lang="de-DE" dirty="0" smtClean="0"/>
+              <a:rPr lang="de-DE" dirty="0"/>
               <a:t>Spielbeschreibung/Regeln</a:t>
             </a:r>
-            <a:endParaRPr lang="de-DE" dirty="0"/>
-          </a:p>
-          <a:p>
-            <a:r>
-              <a:rPr lang="de-DE" dirty="0" smtClean="0"/>
+          </a:p>
+          <a:p>
+            <a:r>
+              <a:rPr lang="de-DE" dirty="0"/>
               <a:t>Karten</a:t>
             </a:r>
           </a:p>
           <a:p>
             <a:r>
-              <a:rPr lang="de-DE" dirty="0" err="1" smtClean="0"/>
+              <a:rPr lang="de-DE" dirty="0" err="1"/>
               <a:t>Mockup</a:t>
             </a:r>
             <a:endParaRPr lang="de-DE" dirty="0"/>
@@ -30729,10 +30556,9 @@
           </a:p>
           <a:p>
             <a:r>
-              <a:rPr lang="de-DE" dirty="0" smtClean="0"/>
+              <a:rPr lang="de-DE" dirty="0"/>
               <a:t>Organisation/Software</a:t>
             </a:r>
-            <a:endParaRPr lang="de-DE" dirty="0"/>
           </a:p>
           <a:p>
             <a:r>
@@ -30752,13 +30578,6 @@
   <p:clrMapOvr>
     <a:masterClrMapping/>
   </p:clrMapOvr>
-  <p:timing>
-    <p:tnLst>
-      <p:par>
-        <p:cTn id="1" dur="indefinite" restart="never" nodeType="tmRoot"/>
-      </p:par>
-    </p:tnLst>
-  </p:timing>
 </p:sld>
 </file>
 
@@ -30784,7 +30603,7 @@
           <p:cNvPr id="2" name="Titel 1">
             <a:extLst>
               <a:ext uri="{FF2B5EF4-FFF2-40B4-BE49-F238E27FC236}">
-                <a16:creationId xmlns:a16="http://schemas.microsoft.com/office/drawing/2014/main" xmlns="" id="{0525B8FD-813E-1949-8DE5-018FE4AE8759}"/>
+                <a16:creationId xmlns:a16="http://schemas.microsoft.com/office/drawing/2014/main" id="{0525B8FD-813E-1949-8DE5-018FE4AE8759}"/>
               </a:ext>
             </a:extLst>
           </p:cNvPr>
@@ -30817,7 +30636,7 @@
           <p:cNvPr id="3" name="Inhaltsplatzhalter 2">
             <a:extLst>
               <a:ext uri="{FF2B5EF4-FFF2-40B4-BE49-F238E27FC236}">
-                <a16:creationId xmlns:a16="http://schemas.microsoft.com/office/drawing/2014/main" xmlns="" id="{762EE8DD-91AC-494D-9395-E2DCAA275E32}"/>
+                <a16:creationId xmlns:a16="http://schemas.microsoft.com/office/drawing/2014/main" id="{762EE8DD-91AC-494D-9395-E2DCAA275E32}"/>
               </a:ext>
             </a:extLst>
           </p:cNvPr>
@@ -31080,7 +30899,7 @@
           <p:cNvPr id="2" name="Titel 1">
             <a:extLst>
               <a:ext uri="{FF2B5EF4-FFF2-40B4-BE49-F238E27FC236}">
-                <a16:creationId xmlns:a16="http://schemas.microsoft.com/office/drawing/2014/main" xmlns="" id="{2EF4FCBA-731E-9F44-8F9A-B1FD7247AFA9}"/>
+                <a16:creationId xmlns:a16="http://schemas.microsoft.com/office/drawing/2014/main" id="{2EF4FCBA-731E-9F44-8F9A-B1FD7247AFA9}"/>
               </a:ext>
             </a:extLst>
           </p:cNvPr>
@@ -31108,7 +30927,7 @@
           <p:cNvPr id="3" name="Inhaltsplatzhalter 2">
             <a:extLst>
               <a:ext uri="{FF2B5EF4-FFF2-40B4-BE49-F238E27FC236}">
-                <a16:creationId xmlns:a16="http://schemas.microsoft.com/office/drawing/2014/main" xmlns="" id="{0D560CEC-8975-1E4B-98B6-7CCEE15EF428}"/>
+                <a16:creationId xmlns:a16="http://schemas.microsoft.com/office/drawing/2014/main" id="{0D560CEC-8975-1E4B-98B6-7CCEE15EF428}"/>
               </a:ext>
             </a:extLst>
           </p:cNvPr>
@@ -31132,12 +30951,16 @@
           <a:lstStyle/>
           <a:p>
             <a:r>
+              <a:rPr lang="de-DE" dirty="0"/>
+              <a:t>Auf der Basis von </a:t>
+            </a:r>
+            <a:r>
               <a:rPr lang="de-DE" dirty="0" err="1"/>
               <a:t>Blackjack</a:t>
             </a:r>
             <a:r>
               <a:rPr lang="de-DE" dirty="0"/>
-              <a:t>-basierend </a:t>
+              <a:t> </a:t>
             </a:r>
           </a:p>
           <a:p>
@@ -31561,7 +31384,7 @@
           <p:cNvPr id="2" name="Titel 1">
             <a:extLst>
               <a:ext uri="{FF2B5EF4-FFF2-40B4-BE49-F238E27FC236}">
-                <a16:creationId xmlns:a16="http://schemas.microsoft.com/office/drawing/2014/main" xmlns="" id="{4652E078-A8AE-A249-A604-314491CEED1F}"/>
+                <a16:creationId xmlns:a16="http://schemas.microsoft.com/office/drawing/2014/main" id="{4652E078-A8AE-A249-A604-314491CEED1F}"/>
               </a:ext>
             </a:extLst>
           </p:cNvPr>
@@ -31589,7 +31412,7 @@
           <p:cNvPr id="3" name="Inhaltsplatzhalter 2">
             <a:extLst>
               <a:ext uri="{FF2B5EF4-FFF2-40B4-BE49-F238E27FC236}">
-                <a16:creationId xmlns:a16="http://schemas.microsoft.com/office/drawing/2014/main" xmlns="" id="{6B2781FC-CC33-9A42-9027-D3FF11A493E3}"/>
+                <a16:creationId xmlns:a16="http://schemas.microsoft.com/office/drawing/2014/main" id="{6B2781FC-CC33-9A42-9027-D3FF11A493E3}"/>
               </a:ext>
             </a:extLst>
           </p:cNvPr>
@@ -31624,7 +31447,7 @@
           <a:p>
             <a:r>
               <a:rPr lang="de-CH" dirty="0"/>
-              <a:t>Diejenigen, die über 180 haben, bekommen 0 </a:t>
+              <a:t>Diejenigen, die über 180KP haben, bekommen 0 </a:t>
             </a:r>
             <a:r>
               <a:rPr lang="de-CH" dirty="0" err="1"/>
@@ -31906,7 +31729,7 @@
           <p:cNvPr id="2" name="Titel 1">
             <a:extLst>
               <a:ext uri="{FF2B5EF4-FFF2-40B4-BE49-F238E27FC236}">
-                <a16:creationId xmlns:a16="http://schemas.microsoft.com/office/drawing/2014/main" xmlns="" id="{A0B6D1F5-044D-5541-AE81-908DF7850310}"/>
+                <a16:creationId xmlns:a16="http://schemas.microsoft.com/office/drawing/2014/main" id="{A0B6D1F5-044D-5541-AE81-908DF7850310}"/>
               </a:ext>
             </a:extLst>
           </p:cNvPr>
@@ -31934,7 +31757,7 @@
           <p:cNvPr id="4" name="Gruppierung 15">
             <a:extLst>
               <a:ext uri="{FF2B5EF4-FFF2-40B4-BE49-F238E27FC236}">
-                <a16:creationId xmlns:a16="http://schemas.microsoft.com/office/drawing/2014/main" xmlns="" id="{F2A3C544-5A54-0041-9D7F-D7920CA26010}"/>
+                <a16:creationId xmlns:a16="http://schemas.microsoft.com/office/drawing/2014/main" id="{F2A3C544-5A54-0041-9D7F-D7920CA26010}"/>
               </a:ext>
             </a:extLst>
           </p:cNvPr>
@@ -31954,7 +31777,7 @@
             <p:cNvPr id="6" name="Gruppierung 9">
               <a:extLst>
                 <a:ext uri="{FF2B5EF4-FFF2-40B4-BE49-F238E27FC236}">
-                  <a16:creationId xmlns:a16="http://schemas.microsoft.com/office/drawing/2014/main" xmlns="" id="{95B575EB-1778-9D48-9118-AD511FA8B493}"/>
+                  <a16:creationId xmlns:a16="http://schemas.microsoft.com/office/drawing/2014/main" id="{95B575EB-1778-9D48-9118-AD511FA8B493}"/>
                 </a:ext>
               </a:extLst>
             </p:cNvPr>
@@ -31974,7 +31797,7 @@
               <p:cNvPr id="8" name="Rechteck 7">
                 <a:extLst>
                   <a:ext uri="{FF2B5EF4-FFF2-40B4-BE49-F238E27FC236}">
-                    <a16:creationId xmlns:a16="http://schemas.microsoft.com/office/drawing/2014/main" xmlns="" id="{2436FA58-3BD4-6B40-B340-006A0868D6BA}"/>
+                    <a16:creationId xmlns:a16="http://schemas.microsoft.com/office/drawing/2014/main" id="{2436FA58-3BD4-6B40-B340-006A0868D6BA}"/>
                   </a:ext>
                 </a:extLst>
               </p:cNvPr>
@@ -32031,7 +31854,7 @@
               <p:cNvPr id="9" name="Bild 7">
                 <a:extLst>
                   <a:ext uri="{FF2B5EF4-FFF2-40B4-BE49-F238E27FC236}">
-                    <a16:creationId xmlns:a16="http://schemas.microsoft.com/office/drawing/2014/main" xmlns="" id="{665F0002-A45D-514D-829F-633BC21DFB0D}"/>
+                    <a16:creationId xmlns:a16="http://schemas.microsoft.com/office/drawing/2014/main" id="{665F0002-A45D-514D-829F-633BC21DFB0D}"/>
                   </a:ext>
                 </a:extLst>
               </p:cNvPr>
@@ -32075,7 +31898,7 @@
               <p:cNvPr id="10" name="Eckige Klammer links/rechts 9">
                 <a:extLst>
                   <a:ext uri="{FF2B5EF4-FFF2-40B4-BE49-F238E27FC236}">
-                    <a16:creationId xmlns:a16="http://schemas.microsoft.com/office/drawing/2014/main" xmlns="" id="{1714D6B3-F7FC-8048-93AD-435B89B1F27A}"/>
+                    <a16:creationId xmlns:a16="http://schemas.microsoft.com/office/drawing/2014/main" id="{1714D6B3-F7FC-8048-93AD-435B89B1F27A}"/>
                   </a:ext>
                 </a:extLst>
               </p:cNvPr>
@@ -32128,7 +31951,7 @@
             <p:cNvPr id="7" name="Textfeld 6">
               <a:extLst>
                 <a:ext uri="{FF2B5EF4-FFF2-40B4-BE49-F238E27FC236}">
-                  <a16:creationId xmlns:a16="http://schemas.microsoft.com/office/drawing/2014/main" xmlns="" id="{8433563C-EE80-EE4E-901C-675959ADA995}"/>
+                  <a16:creationId xmlns:a16="http://schemas.microsoft.com/office/drawing/2014/main" id="{8433563C-EE80-EE4E-901C-675959ADA995}"/>
                 </a:ext>
               </a:extLst>
             </p:cNvPr>
@@ -32165,7 +31988,7 @@
           <p:cNvPr id="11" name="Gruppierung 34">
             <a:extLst>
               <a:ext uri="{FF2B5EF4-FFF2-40B4-BE49-F238E27FC236}">
-                <a16:creationId xmlns:a16="http://schemas.microsoft.com/office/drawing/2014/main" xmlns="" id="{3485E2B2-7841-3142-ABEA-1F3D6C5221A0}"/>
+                <a16:creationId xmlns:a16="http://schemas.microsoft.com/office/drawing/2014/main" id="{3485E2B2-7841-3142-ABEA-1F3D6C5221A0}"/>
               </a:ext>
             </a:extLst>
           </p:cNvPr>
@@ -32185,7 +32008,7 @@
             <p:cNvPr id="12" name="Gruppierung 16">
               <a:extLst>
                 <a:ext uri="{FF2B5EF4-FFF2-40B4-BE49-F238E27FC236}">
-                  <a16:creationId xmlns:a16="http://schemas.microsoft.com/office/drawing/2014/main" xmlns="" id="{EF46E303-78D2-8547-9E8B-E382A416B776}"/>
+                  <a16:creationId xmlns:a16="http://schemas.microsoft.com/office/drawing/2014/main" id="{EF46E303-78D2-8547-9E8B-E382A416B776}"/>
                 </a:ext>
               </a:extLst>
             </p:cNvPr>
@@ -32205,7 +32028,7 @@
               <p:cNvPr id="14" name="Gruppierung 17">
                 <a:extLst>
                   <a:ext uri="{FF2B5EF4-FFF2-40B4-BE49-F238E27FC236}">
-                    <a16:creationId xmlns:a16="http://schemas.microsoft.com/office/drawing/2014/main" xmlns="" id="{283A544A-DFC9-1044-A110-98D01B8B2752}"/>
+                    <a16:creationId xmlns:a16="http://schemas.microsoft.com/office/drawing/2014/main" id="{283A544A-DFC9-1044-A110-98D01B8B2752}"/>
                   </a:ext>
                 </a:extLst>
               </p:cNvPr>
@@ -32225,7 +32048,7 @@
                 <p:cNvPr id="16" name="Rechteck 15">
                   <a:extLst>
                     <a:ext uri="{FF2B5EF4-FFF2-40B4-BE49-F238E27FC236}">
-                      <a16:creationId xmlns:a16="http://schemas.microsoft.com/office/drawing/2014/main" xmlns="" id="{25D14A1D-34B5-0748-9BD4-E1B30A63BA7F}"/>
+                      <a16:creationId xmlns:a16="http://schemas.microsoft.com/office/drawing/2014/main" id="{25D14A1D-34B5-0748-9BD4-E1B30A63BA7F}"/>
                     </a:ext>
                   </a:extLst>
                 </p:cNvPr>
@@ -32282,7 +32105,7 @@
                 <p:cNvPr id="17" name="Eckige Klammer links/rechts 16">
                   <a:extLst>
                     <a:ext uri="{FF2B5EF4-FFF2-40B4-BE49-F238E27FC236}">
-                      <a16:creationId xmlns:a16="http://schemas.microsoft.com/office/drawing/2014/main" xmlns="" id="{6C8B3868-732E-FE41-9BC3-D7D6109C6BFE}"/>
+                      <a16:creationId xmlns:a16="http://schemas.microsoft.com/office/drawing/2014/main" id="{6C8B3868-732E-FE41-9BC3-D7D6109C6BFE}"/>
                     </a:ext>
                   </a:extLst>
                 </p:cNvPr>
@@ -32335,7 +32158,7 @@
               <p:cNvPr id="15" name="Textfeld 14">
                 <a:extLst>
                   <a:ext uri="{FF2B5EF4-FFF2-40B4-BE49-F238E27FC236}">
-                    <a16:creationId xmlns:a16="http://schemas.microsoft.com/office/drawing/2014/main" xmlns="" id="{9E5C2EA2-9192-7D43-A75C-5CDE3672E1D4}"/>
+                    <a16:creationId xmlns:a16="http://schemas.microsoft.com/office/drawing/2014/main" id="{9E5C2EA2-9192-7D43-A75C-5CDE3672E1D4}"/>
                   </a:ext>
                 </a:extLst>
               </p:cNvPr>
@@ -32372,7 +32195,7 @@
             <p:cNvPr id="13" name="Bild 28">
               <a:extLst>
                 <a:ext uri="{FF2B5EF4-FFF2-40B4-BE49-F238E27FC236}">
-                  <a16:creationId xmlns:a16="http://schemas.microsoft.com/office/drawing/2014/main" xmlns="" id="{9BC0CA9E-92A6-5D45-ADF4-315A16BEAF7B}"/>
+                  <a16:creationId xmlns:a16="http://schemas.microsoft.com/office/drawing/2014/main" id="{9BC0CA9E-92A6-5D45-ADF4-315A16BEAF7B}"/>
                 </a:ext>
               </a:extLst>
             </p:cNvPr>
@@ -32409,7 +32232,7 @@
           <p:cNvPr id="18" name="Gruppierung 33">
             <a:extLst>
               <a:ext uri="{FF2B5EF4-FFF2-40B4-BE49-F238E27FC236}">
-                <a16:creationId xmlns:a16="http://schemas.microsoft.com/office/drawing/2014/main" xmlns="" id="{29446206-8E72-3A4B-AE9C-83E3EB1CE839}"/>
+                <a16:creationId xmlns:a16="http://schemas.microsoft.com/office/drawing/2014/main" id="{29446206-8E72-3A4B-AE9C-83E3EB1CE839}"/>
               </a:ext>
             </a:extLst>
           </p:cNvPr>
@@ -32429,7 +32252,7 @@
             <p:cNvPr id="19" name="Gruppierung 22">
               <a:extLst>
                 <a:ext uri="{FF2B5EF4-FFF2-40B4-BE49-F238E27FC236}">
-                  <a16:creationId xmlns:a16="http://schemas.microsoft.com/office/drawing/2014/main" xmlns="" id="{97839AE2-4B6E-F14E-82AD-213862262763}"/>
+                  <a16:creationId xmlns:a16="http://schemas.microsoft.com/office/drawing/2014/main" id="{97839AE2-4B6E-F14E-82AD-213862262763}"/>
                 </a:ext>
               </a:extLst>
             </p:cNvPr>
@@ -32449,7 +32272,7 @@
               <p:cNvPr id="22" name="Rechteck 21">
                 <a:extLst>
                   <a:ext uri="{FF2B5EF4-FFF2-40B4-BE49-F238E27FC236}">
-                    <a16:creationId xmlns:a16="http://schemas.microsoft.com/office/drawing/2014/main" xmlns="" id="{0ACC97E8-9251-3342-87EE-637613E70539}"/>
+                    <a16:creationId xmlns:a16="http://schemas.microsoft.com/office/drawing/2014/main" id="{0ACC97E8-9251-3342-87EE-637613E70539}"/>
                   </a:ext>
                 </a:extLst>
               </p:cNvPr>
@@ -32506,7 +32329,7 @@
               <p:cNvPr id="23" name="Textfeld 22">
                 <a:extLst>
                   <a:ext uri="{FF2B5EF4-FFF2-40B4-BE49-F238E27FC236}">
-                    <a16:creationId xmlns:a16="http://schemas.microsoft.com/office/drawing/2014/main" xmlns="" id="{3893EA98-6F38-9548-930E-D31D3D2D40C8}"/>
+                    <a16:creationId xmlns:a16="http://schemas.microsoft.com/office/drawing/2014/main" id="{3893EA98-6F38-9548-930E-D31D3D2D40C8}"/>
                   </a:ext>
                 </a:extLst>
               </p:cNvPr>
@@ -32543,7 +32366,7 @@
             <p:cNvPr id="20" name="Eckige Klammer links/rechts 19">
               <a:extLst>
                 <a:ext uri="{FF2B5EF4-FFF2-40B4-BE49-F238E27FC236}">
-                  <a16:creationId xmlns:a16="http://schemas.microsoft.com/office/drawing/2014/main" xmlns="" id="{F480CA3F-AEDA-7C4E-88F9-3700D8B80FA9}"/>
+                  <a16:creationId xmlns:a16="http://schemas.microsoft.com/office/drawing/2014/main" id="{F480CA3F-AEDA-7C4E-88F9-3700D8B80FA9}"/>
                 </a:ext>
               </a:extLst>
             </p:cNvPr>
@@ -32595,7 +32418,7 @@
             <p:cNvPr id="21" name="Bild 32">
               <a:extLst>
                 <a:ext uri="{FF2B5EF4-FFF2-40B4-BE49-F238E27FC236}">
-                  <a16:creationId xmlns:a16="http://schemas.microsoft.com/office/drawing/2014/main" xmlns="" id="{A33C873E-CAF6-2D46-8A47-CF75F155C7F4}"/>
+                  <a16:creationId xmlns:a16="http://schemas.microsoft.com/office/drawing/2014/main" id="{A33C873E-CAF6-2D46-8A47-CF75F155C7F4}"/>
                 </a:ext>
               </a:extLst>
             </p:cNvPr>
@@ -32832,7 +32655,7 @@
           <p:cNvPr id="2" name="Titel 1">
             <a:extLst>
               <a:ext uri="{FF2B5EF4-FFF2-40B4-BE49-F238E27FC236}">
-                <a16:creationId xmlns:a16="http://schemas.microsoft.com/office/drawing/2014/main" xmlns="" id="{203376D5-E3AD-2542-A70C-357F076A9AB8}"/>
+                <a16:creationId xmlns:a16="http://schemas.microsoft.com/office/drawing/2014/main" id="{203376D5-E3AD-2542-A70C-357F076A9AB8}"/>
               </a:ext>
             </a:extLst>
           </p:cNvPr>
@@ -32873,13 +32696,6 @@
   <p:clrMapOvr>
     <a:masterClrMapping/>
   </p:clrMapOvr>
-  <p:timing>
-    <p:tnLst>
-      <p:par>
-        <p:cTn id="1" dur="indefinite" restart="never" nodeType="tmRoot"/>
-      </p:par>
-    </p:tnLst>
-  </p:timing>
 </p:sld>
 </file>
 

</xml_diff>